<commit_message>
Update use case and pictures
</commit_message>
<xml_diff>
--- a/docs/RFP/Threat-Risk RFP Pictures.pptx
+++ b/docs/RFP/Threat-Risk RFP Pictures.pptx
@@ -289,7 +289,7 @@
           <a:p>
             <a:fld id="{AFD66651-D9BC-4BF5-827C-0F78836D3353}" type="datetimeFigureOut">
               <a:rPr lang="en-US" smtClean="0"/>
-              <a:t>4/30/2014</a:t>
+              <a:t>5/9/2014</a:t>
             </a:fld>
             <a:endParaRPr lang="en-US"/>
           </a:p>
@@ -459,7 +459,7 @@
           <a:p>
             <a:fld id="{AFD66651-D9BC-4BF5-827C-0F78836D3353}" type="datetimeFigureOut">
               <a:rPr lang="en-US" smtClean="0"/>
-              <a:t>4/30/2014</a:t>
+              <a:t>5/9/2014</a:t>
             </a:fld>
             <a:endParaRPr lang="en-US"/>
           </a:p>
@@ -639,7 +639,7 @@
           <a:p>
             <a:fld id="{AFD66651-D9BC-4BF5-827C-0F78836D3353}" type="datetimeFigureOut">
               <a:rPr lang="en-US" smtClean="0"/>
-              <a:t>4/30/2014</a:t>
+              <a:t>5/9/2014</a:t>
             </a:fld>
             <a:endParaRPr lang="en-US"/>
           </a:p>
@@ -809,7 +809,7 @@
           <a:p>
             <a:fld id="{AFD66651-D9BC-4BF5-827C-0F78836D3353}" type="datetimeFigureOut">
               <a:rPr lang="en-US" smtClean="0"/>
-              <a:t>4/30/2014</a:t>
+              <a:t>5/9/2014</a:t>
             </a:fld>
             <a:endParaRPr lang="en-US"/>
           </a:p>
@@ -1055,7 +1055,7 @@
           <a:p>
             <a:fld id="{AFD66651-D9BC-4BF5-827C-0F78836D3353}" type="datetimeFigureOut">
               <a:rPr lang="en-US" smtClean="0"/>
-              <a:t>4/30/2014</a:t>
+              <a:t>5/9/2014</a:t>
             </a:fld>
             <a:endParaRPr lang="en-US"/>
           </a:p>
@@ -1343,7 +1343,7 @@
           <a:p>
             <a:fld id="{AFD66651-D9BC-4BF5-827C-0F78836D3353}" type="datetimeFigureOut">
               <a:rPr lang="en-US" smtClean="0"/>
-              <a:t>4/30/2014</a:t>
+              <a:t>5/9/2014</a:t>
             </a:fld>
             <a:endParaRPr lang="en-US"/>
           </a:p>
@@ -1765,7 +1765,7 @@
           <a:p>
             <a:fld id="{AFD66651-D9BC-4BF5-827C-0F78836D3353}" type="datetimeFigureOut">
               <a:rPr lang="en-US" smtClean="0"/>
-              <a:t>4/30/2014</a:t>
+              <a:t>5/9/2014</a:t>
             </a:fld>
             <a:endParaRPr lang="en-US"/>
           </a:p>
@@ -1883,7 +1883,7 @@
           <a:p>
             <a:fld id="{AFD66651-D9BC-4BF5-827C-0F78836D3353}" type="datetimeFigureOut">
               <a:rPr lang="en-US" smtClean="0"/>
-              <a:t>4/30/2014</a:t>
+              <a:t>5/9/2014</a:t>
             </a:fld>
             <a:endParaRPr lang="en-US"/>
           </a:p>
@@ -1978,7 +1978,7 @@
           <a:p>
             <a:fld id="{AFD66651-D9BC-4BF5-827C-0F78836D3353}" type="datetimeFigureOut">
               <a:rPr lang="en-US" smtClean="0"/>
-              <a:t>4/30/2014</a:t>
+              <a:t>5/9/2014</a:t>
             </a:fld>
             <a:endParaRPr lang="en-US"/>
           </a:p>
@@ -2255,7 +2255,7 @@
           <a:p>
             <a:fld id="{AFD66651-D9BC-4BF5-827C-0F78836D3353}" type="datetimeFigureOut">
               <a:rPr lang="en-US" smtClean="0"/>
-              <a:t>4/30/2014</a:t>
+              <a:t>5/9/2014</a:t>
             </a:fld>
             <a:endParaRPr lang="en-US"/>
           </a:p>
@@ -2508,7 +2508,7 @@
           <a:p>
             <a:fld id="{AFD66651-D9BC-4BF5-827C-0F78836D3353}" type="datetimeFigureOut">
               <a:rPr lang="en-US" smtClean="0"/>
-              <a:t>4/30/2014</a:t>
+              <a:t>5/9/2014</a:t>
             </a:fld>
             <a:endParaRPr lang="en-US"/>
           </a:p>
@@ -2721,7 +2721,7 @@
           <a:p>
             <a:fld id="{AFD66651-D9BC-4BF5-827C-0F78836D3353}" type="datetimeFigureOut">
               <a:rPr lang="en-US" smtClean="0"/>
-              <a:t>4/30/2014</a:t>
+              <a:t>5/9/2014</a:t>
             </a:fld>
             <a:endParaRPr lang="en-US"/>
           </a:p>
@@ -3170,6 +3170,63 @@
       </p:grpSpPr>
       <p:sp>
         <p:nvSpPr>
+          <p:cNvPr id="20" name="Up Arrow 19"/>
+          <p:cNvSpPr/>
+          <p:nvPr/>
+        </p:nvSpPr>
+        <p:spPr>
+          <a:xfrm>
+            <a:off x="856962" y="1744040"/>
+            <a:ext cx="265922" cy="1652838"/>
+          </a:xfrm>
+          <a:prstGeom prst="upArrow">
+            <a:avLst/>
+          </a:prstGeom>
+          <a:gradFill>
+            <a:gsLst>
+              <a:gs pos="0">
+                <a:schemeClr val="accent1">
+                  <a:tint val="100000"/>
+                  <a:shade val="100000"/>
+                  <a:satMod val="130000"/>
+                  <a:alpha val="27000"/>
+                </a:schemeClr>
+              </a:gs>
+              <a:gs pos="100000">
+                <a:schemeClr val="accent1">
+                  <a:tint val="50000"/>
+                  <a:shade val="100000"/>
+                  <a:satMod val="350000"/>
+                </a:schemeClr>
+              </a:gs>
+            </a:gsLst>
+          </a:gradFill>
+        </p:spPr>
+        <p:style>
+          <a:lnRef idx="1">
+            <a:schemeClr val="accent1"/>
+          </a:lnRef>
+          <a:fillRef idx="3">
+            <a:schemeClr val="accent1"/>
+          </a:fillRef>
+          <a:effectRef idx="2">
+            <a:schemeClr val="accent1"/>
+          </a:effectRef>
+          <a:fontRef idx="minor">
+            <a:schemeClr val="lt1"/>
+          </a:fontRef>
+        </p:style>
+        <p:txBody>
+          <a:bodyPr rtlCol="0" anchor="ctr"/>
+          <a:lstStyle/>
+          <a:p>
+            <a:pPr algn="ctr"/>
+            <a:endParaRPr lang="en-US"/>
+          </a:p>
+        </p:txBody>
+      </p:sp>
+      <p:sp>
+        <p:nvSpPr>
           <p:cNvPr id="4" name="Title 3"/>
           <p:cNvSpPr>
             <a:spLocks noGrp="1"/>
@@ -3283,8 +3340,8 @@
         </p:nvSpPr>
         <p:spPr>
           <a:xfrm>
-            <a:off x="7217229" y="1744045"/>
-            <a:ext cx="1399592" cy="1135841"/>
+            <a:off x="7063274" y="1744045"/>
+            <a:ext cx="1651518" cy="1371600"/>
           </a:xfrm>
           <a:prstGeom prst="rect">
             <a:avLst/>
@@ -3315,6 +3372,16 @@
           <a:lstStyle/>
           <a:p>
             <a:pPr algn="ctr"/>
+            <a:endParaRPr lang="en-US" dirty="0" smtClean="0">
+              <a:solidFill>
+                <a:schemeClr val="bg2">
+                  <a:lumMod val="25000"/>
+                </a:schemeClr>
+              </a:solidFill>
+            </a:endParaRPr>
+          </a:p>
+          <a:p>
+            <a:pPr algn="ctr"/>
             <a:r>
               <a:rPr lang="en-US" dirty="0" smtClean="0">
                 <a:solidFill>
@@ -3323,8 +3390,11 @@
                   </a:schemeClr>
                 </a:solidFill>
               </a:rPr>
-              <a:t>Law Enforcement threats &amp; risks</a:t>
-            </a:r>
+              <a:t>Law Enforcement / Emergence Management Concepts</a:t>
+            </a:r>
+          </a:p>
+          <a:p>
+            <a:pPr algn="ctr"/>
             <a:endParaRPr lang="en-US" dirty="0">
               <a:solidFill>
                 <a:schemeClr val="bg2">
@@ -3396,7 +3466,7 @@
         </p:nvSpPr>
         <p:spPr>
           <a:xfrm>
-            <a:off x="5411756" y="3115645"/>
+            <a:off x="5156280" y="3115645"/>
             <a:ext cx="1651518" cy="867747"/>
           </a:xfrm>
           <a:prstGeom prst="roundRect">
@@ -3479,14 +3549,14 @@
       </p:sp>
       <p:sp>
         <p:nvSpPr>
-          <p:cNvPr id="18" name="Rounded Rectangle 17"/>
+          <p:cNvPr id="19" name="Rounded Rectangle 18"/>
           <p:cNvSpPr/>
           <p:nvPr/>
         </p:nvSpPr>
         <p:spPr>
           <a:xfrm>
-            <a:off x="7217229" y="4285082"/>
-            <a:ext cx="1651518" cy="867747"/>
+            <a:off x="6932382" y="4281972"/>
+            <a:ext cx="1913301" cy="867747"/>
           </a:xfrm>
           <a:prstGeom prst="roundRect">
             <a:avLst/>
@@ -3525,58 +3595,8 @@
                   </a:schemeClr>
                 </a:solidFill>
               </a:rPr>
-              <a:t>NIEM Suspicious Activity</a:t>
-            </a:r>
-            <a:endParaRPr lang="en-US" dirty="0">
-              <a:solidFill>
-                <a:schemeClr val="bg2">
-                  <a:lumMod val="25000"/>
-                </a:schemeClr>
-              </a:solidFill>
-            </a:endParaRPr>
-          </a:p>
-        </p:txBody>
-      </p:sp>
-      <p:sp>
-        <p:nvSpPr>
-          <p:cNvPr id="19" name="Rounded Rectangle 18"/>
-          <p:cNvSpPr/>
-          <p:nvPr/>
-        </p:nvSpPr>
-        <p:spPr>
-          <a:xfrm>
-            <a:off x="7217229" y="5149719"/>
-            <a:ext cx="1651518" cy="867747"/>
-          </a:xfrm>
-          <a:prstGeom prst="roundRect">
-            <a:avLst/>
-          </a:prstGeom>
-          <a:solidFill>
-            <a:schemeClr val="accent4">
-              <a:lumMod val="75000"/>
-              <a:alpha val="49000"/>
-            </a:schemeClr>
-          </a:solidFill>
-        </p:spPr>
-        <p:style>
-          <a:lnRef idx="1">
-            <a:schemeClr val="accent1"/>
-          </a:lnRef>
-          <a:fillRef idx="3">
-            <a:schemeClr val="accent1"/>
-          </a:fillRef>
-          <a:effectRef idx="2">
-            <a:schemeClr val="accent1"/>
-          </a:effectRef>
-          <a:fontRef idx="minor">
-            <a:schemeClr val="lt1"/>
-          </a:fontRef>
-        </p:style>
-        <p:txBody>
-          <a:bodyPr rtlCol="0" anchor="ctr"/>
-          <a:lstStyle/>
-          <a:p>
-            <a:pPr algn="ctr"/>
+              <a:t>NIEM </a:t>
+            </a:r>
             <a:r>
               <a:rPr lang="en-US" dirty="0" smtClean="0">
                 <a:solidFill>
@@ -3585,7 +3605,20 @@
                   </a:schemeClr>
                 </a:solidFill>
               </a:rPr>
-              <a:t>NIEM (Others)</a:t>
+              <a:t>Exchanges</a:t>
+            </a:r>
+          </a:p>
+          <a:p>
+            <a:pPr algn="ctr"/>
+            <a:r>
+              <a:rPr lang="en-US" dirty="0" smtClean="0">
+                <a:solidFill>
+                  <a:schemeClr val="bg2">
+                    <a:lumMod val="25000"/>
+                  </a:schemeClr>
+                </a:solidFill>
+              </a:rPr>
+              <a:t>EDXL / CAP</a:t>
             </a:r>
             <a:endParaRPr lang="en-US" dirty="0">
               <a:solidFill>
@@ -3788,7 +3821,7 @@
         <p:spPr>
           <a:xfrm>
             <a:off x="233266" y="3401781"/>
-            <a:ext cx="1651518" cy="867747"/>
+            <a:ext cx="1651518" cy="2268121"/>
           </a:xfrm>
           <a:prstGeom prst="roundRect">
             <a:avLst/>
@@ -3820,16 +3853,85 @@
           <a:p>
             <a:pPr algn="ctr"/>
             <a:r>
-              <a:rPr lang="en-US" dirty="0" smtClean="0">
+              <a:rPr lang="en-US" sz="1400" dirty="0" smtClean="0">
                 <a:solidFill>
                   <a:schemeClr val="bg2">
                     <a:lumMod val="25000"/>
                   </a:schemeClr>
                 </a:solidFill>
               </a:rPr>
-              <a:t>STIX/TAXII</a:t>
-            </a:r>
-            <a:endParaRPr lang="en-US" dirty="0">
+              <a:t>STIX/</a:t>
+            </a:r>
+            <a:r>
+              <a:rPr lang="en-US" sz="1400" dirty="0" err="1" smtClean="0">
+                <a:solidFill>
+                  <a:schemeClr val="bg2">
+                    <a:lumMod val="25000"/>
+                  </a:schemeClr>
+                </a:solidFill>
+              </a:rPr>
+              <a:t>TAXIICybox</a:t>
+            </a:r>
+            <a:endParaRPr lang="en-US" sz="1400" dirty="0" smtClean="0">
+              <a:solidFill>
+                <a:schemeClr val="bg2">
+                  <a:lumMod val="25000"/>
+                </a:schemeClr>
+              </a:solidFill>
+            </a:endParaRPr>
+          </a:p>
+          <a:p>
+            <a:pPr algn="ctr"/>
+            <a:r>
+              <a:rPr lang="en-US" sz="1400" dirty="0" smtClean="0">
+                <a:solidFill>
+                  <a:schemeClr val="bg2">
+                    <a:lumMod val="25000"/>
+                  </a:schemeClr>
+                </a:solidFill>
+              </a:rPr>
+              <a:t>SACM</a:t>
+            </a:r>
+          </a:p>
+          <a:p>
+            <a:pPr algn="ctr"/>
+            <a:r>
+              <a:rPr lang="en-US" sz="1400" dirty="0" smtClean="0">
+                <a:solidFill>
+                  <a:schemeClr val="bg2">
+                    <a:lumMod val="25000"/>
+                  </a:schemeClr>
+                </a:solidFill>
+              </a:rPr>
+              <a:t>ISO</a:t>
+            </a:r>
+          </a:p>
+          <a:p>
+            <a:pPr algn="ctr"/>
+            <a:r>
+              <a:rPr lang="en-US" sz="1400" dirty="0" smtClean="0">
+                <a:solidFill>
+                  <a:schemeClr val="bg2">
+                    <a:lumMod val="25000"/>
+                  </a:schemeClr>
+                </a:solidFill>
+              </a:rPr>
+              <a:t>NIST</a:t>
+            </a:r>
+          </a:p>
+          <a:p>
+            <a:pPr algn="ctr"/>
+            <a:r>
+              <a:rPr lang="en-US" sz="1400" dirty="0" smtClean="0">
+                <a:solidFill>
+                  <a:schemeClr val="bg2">
+                    <a:lumMod val="25000"/>
+                  </a:schemeClr>
+                </a:solidFill>
+              </a:rPr>
+              <a:t>Others…</a:t>
+            </a:r>
+            <a:endParaRPr lang="en-US" sz="1400" dirty="0">
               <a:solidFill>
                 <a:schemeClr val="bg2">
                   <a:lumMod val="25000"/>
@@ -3877,8 +3979,8 @@
         </p:nvSpPr>
         <p:spPr>
           <a:xfrm>
-            <a:off x="7849379" y="2879886"/>
-            <a:ext cx="265922" cy="1389642"/>
+            <a:off x="7756072" y="3115645"/>
+            <a:ext cx="265922" cy="1166326"/>
           </a:xfrm>
           <a:prstGeom prst="upArrow">
             <a:avLst/>

</xml_diff>

<commit_message>
Include "Operational" and JD comments
</commit_message>
<xml_diff>
--- a/docs/RFP/Threat-Risk RFP Pictures.pptx
+++ b/docs/RFP/Threat-Risk RFP Pictures.pptx
@@ -7,6 +7,7 @@
   <p:sldIdLst>
     <p:sldId id="256" r:id="rId2"/>
     <p:sldId id="257" r:id="rId3"/>
+    <p:sldId id="258" r:id="rId4"/>
   </p:sldIdLst>
   <p:sldSz cx="9144000" cy="6858000" type="screen4x3"/>
   <p:notesSz cx="6858000" cy="9144000"/>
@@ -289,7 +290,7 @@
           <a:p>
             <a:fld id="{AFD66651-D9BC-4BF5-827C-0F78836D3353}" type="datetimeFigureOut">
               <a:rPr lang="en-US" smtClean="0"/>
-              <a:t>5/9/2014</a:t>
+              <a:t>5/12/2014</a:t>
             </a:fld>
             <a:endParaRPr lang="en-US"/>
           </a:p>
@@ -459,7 +460,7 @@
           <a:p>
             <a:fld id="{AFD66651-D9BC-4BF5-827C-0F78836D3353}" type="datetimeFigureOut">
               <a:rPr lang="en-US" smtClean="0"/>
-              <a:t>5/9/2014</a:t>
+              <a:t>5/12/2014</a:t>
             </a:fld>
             <a:endParaRPr lang="en-US"/>
           </a:p>
@@ -639,7 +640,7 @@
           <a:p>
             <a:fld id="{AFD66651-D9BC-4BF5-827C-0F78836D3353}" type="datetimeFigureOut">
               <a:rPr lang="en-US" smtClean="0"/>
-              <a:t>5/9/2014</a:t>
+              <a:t>5/12/2014</a:t>
             </a:fld>
             <a:endParaRPr lang="en-US"/>
           </a:p>
@@ -809,7 +810,7 @@
           <a:p>
             <a:fld id="{AFD66651-D9BC-4BF5-827C-0F78836D3353}" type="datetimeFigureOut">
               <a:rPr lang="en-US" smtClean="0"/>
-              <a:t>5/9/2014</a:t>
+              <a:t>5/12/2014</a:t>
             </a:fld>
             <a:endParaRPr lang="en-US"/>
           </a:p>
@@ -1055,7 +1056,7 @@
           <a:p>
             <a:fld id="{AFD66651-D9BC-4BF5-827C-0F78836D3353}" type="datetimeFigureOut">
               <a:rPr lang="en-US" smtClean="0"/>
-              <a:t>5/9/2014</a:t>
+              <a:t>5/12/2014</a:t>
             </a:fld>
             <a:endParaRPr lang="en-US"/>
           </a:p>
@@ -1343,7 +1344,7 @@
           <a:p>
             <a:fld id="{AFD66651-D9BC-4BF5-827C-0F78836D3353}" type="datetimeFigureOut">
               <a:rPr lang="en-US" smtClean="0"/>
-              <a:t>5/9/2014</a:t>
+              <a:t>5/12/2014</a:t>
             </a:fld>
             <a:endParaRPr lang="en-US"/>
           </a:p>
@@ -1765,7 +1766,7 @@
           <a:p>
             <a:fld id="{AFD66651-D9BC-4BF5-827C-0F78836D3353}" type="datetimeFigureOut">
               <a:rPr lang="en-US" smtClean="0"/>
-              <a:t>5/9/2014</a:t>
+              <a:t>5/12/2014</a:t>
             </a:fld>
             <a:endParaRPr lang="en-US"/>
           </a:p>
@@ -1883,7 +1884,7 @@
           <a:p>
             <a:fld id="{AFD66651-D9BC-4BF5-827C-0F78836D3353}" type="datetimeFigureOut">
               <a:rPr lang="en-US" smtClean="0"/>
-              <a:t>5/9/2014</a:t>
+              <a:t>5/12/2014</a:t>
             </a:fld>
             <a:endParaRPr lang="en-US"/>
           </a:p>
@@ -1978,7 +1979,7 @@
           <a:p>
             <a:fld id="{AFD66651-D9BC-4BF5-827C-0F78836D3353}" type="datetimeFigureOut">
               <a:rPr lang="en-US" smtClean="0"/>
-              <a:t>5/9/2014</a:t>
+              <a:t>5/12/2014</a:t>
             </a:fld>
             <a:endParaRPr lang="en-US"/>
           </a:p>
@@ -2255,7 +2256,7 @@
           <a:p>
             <a:fld id="{AFD66651-D9BC-4BF5-827C-0F78836D3353}" type="datetimeFigureOut">
               <a:rPr lang="en-US" smtClean="0"/>
-              <a:t>5/9/2014</a:t>
+              <a:t>5/12/2014</a:t>
             </a:fld>
             <a:endParaRPr lang="en-US"/>
           </a:p>
@@ -2508,7 +2509,7 @@
           <a:p>
             <a:fld id="{AFD66651-D9BC-4BF5-827C-0F78836D3353}" type="datetimeFigureOut">
               <a:rPr lang="en-US" smtClean="0"/>
-              <a:t>5/9/2014</a:t>
+              <a:t>5/12/2014</a:t>
             </a:fld>
             <a:endParaRPr lang="en-US"/>
           </a:p>
@@ -2721,7 +2722,7 @@
           <a:p>
             <a:fld id="{AFD66651-D9BC-4BF5-827C-0F78836D3353}" type="datetimeFigureOut">
               <a:rPr lang="en-US" smtClean="0"/>
-              <a:t>5/9/2014</a:t>
+              <a:t>5/12/2014</a:t>
             </a:fld>
             <a:endParaRPr lang="en-US"/>
           </a:p>
@@ -3595,17 +3596,7 @@
                   </a:schemeClr>
                 </a:solidFill>
               </a:rPr>
-              <a:t>NIEM </a:t>
-            </a:r>
-            <a:r>
-              <a:rPr lang="en-US" dirty="0" smtClean="0">
-                <a:solidFill>
-                  <a:schemeClr val="bg2">
-                    <a:lumMod val="25000"/>
-                  </a:schemeClr>
-                </a:solidFill>
-              </a:rPr>
-              <a:t>Exchanges</a:t>
+              <a:t>NIEM Exchanges</a:t>
             </a:r>
           </a:p>
           <a:p>
@@ -4074,6 +4065,935 @@
     <p:extLst>
       <p:ext uri="{BB962C8B-B14F-4D97-AF65-F5344CB8AC3E}">
         <p14:creationId xmlns:p14="http://schemas.microsoft.com/office/powerpoint/2010/main" val="2007145722"/>
+      </p:ext>
+    </p:extLst>
+  </p:cSld>
+  <p:clrMapOvr>
+    <a:masterClrMapping/>
+  </p:clrMapOvr>
+  <p:timing>
+    <p:tnLst>
+      <p:par>
+        <p:cTn id="1" dur="indefinite" restart="never" nodeType="tmRoot"/>
+      </p:par>
+    </p:tnLst>
+  </p:timing>
+</p:sld>
+</file>
+
+<file path=ppt/slides/slide3.xml><?xml version="1.0" encoding="utf-8"?>
+<p:sld xmlns:a="http://schemas.openxmlformats.org/drawingml/2006/main" xmlns:r="http://schemas.openxmlformats.org/officeDocument/2006/relationships" xmlns:p="http://schemas.openxmlformats.org/presentationml/2006/main">
+  <p:cSld>
+    <p:spTree>
+      <p:nvGrpSpPr>
+        <p:cNvPr id="1" name=""/>
+        <p:cNvGrpSpPr/>
+        <p:nvPr/>
+      </p:nvGrpSpPr>
+      <p:grpSpPr>
+        <a:xfrm>
+          <a:off x="0" y="0"/>
+          <a:ext cx="0" cy="0"/>
+          <a:chOff x="0" y="0"/>
+          <a:chExt cx="0" cy="0"/>
+        </a:xfrm>
+      </p:grpSpPr>
+      <p:sp>
+        <p:nvSpPr>
+          <p:cNvPr id="4" name="Title 3"/>
+          <p:cNvSpPr>
+            <a:spLocks noGrp="1"/>
+          </p:cNvSpPr>
+          <p:nvPr>
+            <p:ph type="title"/>
+          </p:nvPr>
+        </p:nvSpPr>
+        <p:spPr/>
+        <p:txBody>
+          <a:bodyPr/>
+          <a:lstStyle/>
+          <a:p>
+            <a:r>
+              <a:rPr lang="en-US" dirty="0" smtClean="0"/>
+              <a:t>Initial Focus</a:t>
+            </a:r>
+            <a:endParaRPr lang="en-US" dirty="0"/>
+          </a:p>
+        </p:txBody>
+      </p:sp>
+      <p:sp>
+        <p:nvSpPr>
+          <p:cNvPr id="5" name="Rectangle 4"/>
+          <p:cNvSpPr/>
+          <p:nvPr/>
+        </p:nvSpPr>
+        <p:spPr>
+          <a:xfrm>
+            <a:off x="334851" y="1333498"/>
+            <a:ext cx="8441729" cy="410547"/>
+          </a:xfrm>
+          <a:prstGeom prst="rect">
+            <a:avLst/>
+          </a:prstGeom>
+        </p:spPr>
+        <p:style>
+          <a:lnRef idx="1">
+            <a:schemeClr val="accent1"/>
+          </a:lnRef>
+          <a:fillRef idx="3">
+            <a:schemeClr val="accent1"/>
+          </a:fillRef>
+          <a:effectRef idx="2">
+            <a:schemeClr val="accent1"/>
+          </a:effectRef>
+          <a:fontRef idx="minor">
+            <a:schemeClr val="lt1"/>
+          </a:fontRef>
+        </p:style>
+        <p:txBody>
+          <a:bodyPr rtlCol="0" anchor="ctr"/>
+          <a:lstStyle/>
+          <a:p>
+            <a:pPr algn="ctr"/>
+            <a:r>
+              <a:rPr lang="en-US" dirty="0" smtClean="0"/>
+              <a:t>Wide &amp; </a:t>
+            </a:r>
+            <a:r>
+              <a:rPr lang="en-US" dirty="0" smtClean="0"/>
+              <a:t>shallow </a:t>
+            </a:r>
+            <a:r>
+              <a:rPr lang="en-US" dirty="0" smtClean="0"/>
+              <a:t>conceptual model covering threats and risks</a:t>
+            </a:r>
+            <a:endParaRPr lang="en-US" dirty="0"/>
+          </a:p>
+        </p:txBody>
+      </p:sp>
+      <p:sp>
+        <p:nvSpPr>
+          <p:cNvPr id="6" name="Rectangle 5"/>
+          <p:cNvSpPr/>
+          <p:nvPr/>
+        </p:nvSpPr>
+        <p:spPr>
+          <a:xfrm>
+            <a:off x="4063528" y="2155914"/>
+            <a:ext cx="2156971" cy="836589"/>
+          </a:xfrm>
+          <a:prstGeom prst="rect">
+            <a:avLst/>
+          </a:prstGeom>
+        </p:spPr>
+        <p:style>
+          <a:lnRef idx="1">
+            <a:schemeClr val="accent1"/>
+          </a:lnRef>
+          <a:fillRef idx="3">
+            <a:schemeClr val="accent1"/>
+          </a:fillRef>
+          <a:effectRef idx="2">
+            <a:schemeClr val="accent1"/>
+          </a:effectRef>
+          <a:fontRef idx="minor">
+            <a:schemeClr val="lt1"/>
+          </a:fontRef>
+        </p:style>
+        <p:txBody>
+          <a:bodyPr rtlCol="0" anchor="ctr"/>
+          <a:lstStyle/>
+          <a:p>
+            <a:pPr algn="ctr"/>
+            <a:r>
+              <a:rPr lang="en-US" dirty="0" smtClean="0"/>
+              <a:t>High level Cyber-threat/risk concepts</a:t>
+            </a:r>
+            <a:endParaRPr lang="en-US" dirty="0"/>
+          </a:p>
+        </p:txBody>
+      </p:sp>
+      <p:sp>
+        <p:nvSpPr>
+          <p:cNvPr id="10" name="Rectangle 9"/>
+          <p:cNvSpPr/>
+          <p:nvPr/>
+        </p:nvSpPr>
+        <p:spPr>
+          <a:xfrm>
+            <a:off x="7353835" y="2155915"/>
+            <a:ext cx="1291853" cy="1371600"/>
+          </a:xfrm>
+          <a:prstGeom prst="rect">
+            <a:avLst/>
+          </a:prstGeom>
+          <a:solidFill>
+            <a:schemeClr val="accent1">
+              <a:lumMod val="20000"/>
+              <a:lumOff val="80000"/>
+            </a:schemeClr>
+          </a:solidFill>
+        </p:spPr>
+        <p:style>
+          <a:lnRef idx="1">
+            <a:schemeClr val="accent1"/>
+          </a:lnRef>
+          <a:fillRef idx="3">
+            <a:schemeClr val="accent1"/>
+          </a:fillRef>
+          <a:effectRef idx="2">
+            <a:schemeClr val="accent1"/>
+          </a:effectRef>
+          <a:fontRef idx="minor">
+            <a:schemeClr val="lt1"/>
+          </a:fontRef>
+        </p:style>
+        <p:txBody>
+          <a:bodyPr rtlCol="0" anchor="ctr"/>
+          <a:lstStyle/>
+          <a:p>
+            <a:pPr algn="ctr"/>
+            <a:endParaRPr lang="en-US" sz="1400" dirty="0" smtClean="0">
+              <a:solidFill>
+                <a:schemeClr val="bg2">
+                  <a:lumMod val="25000"/>
+                </a:schemeClr>
+              </a:solidFill>
+            </a:endParaRPr>
+          </a:p>
+          <a:p>
+            <a:pPr algn="ctr"/>
+            <a:r>
+              <a:rPr lang="en-US" sz="1400" dirty="0" smtClean="0">
+                <a:solidFill>
+                  <a:schemeClr val="bg2">
+                    <a:lumMod val="25000"/>
+                  </a:schemeClr>
+                </a:solidFill>
+              </a:rPr>
+              <a:t>Law Enforcement / Emergence Management Concepts</a:t>
+            </a:r>
+          </a:p>
+          <a:p>
+            <a:pPr algn="ctr"/>
+            <a:endParaRPr lang="en-US" sz="1400" dirty="0">
+              <a:solidFill>
+                <a:schemeClr val="bg2">
+                  <a:lumMod val="25000"/>
+                </a:schemeClr>
+              </a:solidFill>
+            </a:endParaRPr>
+          </a:p>
+        </p:txBody>
+      </p:sp>
+      <p:sp>
+        <p:nvSpPr>
+          <p:cNvPr id="14" name="Rounded Rectangle 13"/>
+          <p:cNvSpPr/>
+          <p:nvPr/>
+        </p:nvSpPr>
+        <p:spPr>
+          <a:xfrm>
+            <a:off x="5648569" y="3526196"/>
+            <a:ext cx="1705265" cy="867747"/>
+          </a:xfrm>
+          <a:prstGeom prst="roundRect">
+            <a:avLst/>
+          </a:prstGeom>
+          <a:solidFill>
+            <a:schemeClr val="accent4">
+              <a:lumMod val="75000"/>
+            </a:schemeClr>
+          </a:solidFill>
+        </p:spPr>
+        <p:style>
+          <a:lnRef idx="1">
+            <a:schemeClr val="accent1"/>
+          </a:lnRef>
+          <a:fillRef idx="3">
+            <a:schemeClr val="accent1"/>
+          </a:fillRef>
+          <a:effectRef idx="2">
+            <a:schemeClr val="accent1"/>
+          </a:effectRef>
+          <a:fontRef idx="minor">
+            <a:schemeClr val="lt1"/>
+          </a:fontRef>
+        </p:style>
+        <p:txBody>
+          <a:bodyPr rtlCol="0" anchor="ctr"/>
+          <a:lstStyle/>
+          <a:p>
+            <a:pPr algn="ctr"/>
+            <a:r>
+              <a:rPr lang="en-US" dirty="0" smtClean="0"/>
+              <a:t>NIEM Threat/Risk </a:t>
+            </a:r>
+            <a:r>
+              <a:rPr lang="en-US" dirty="0" smtClean="0"/>
+              <a:t>Representation</a:t>
+            </a:r>
+            <a:endParaRPr lang="en-US" dirty="0"/>
+          </a:p>
+        </p:txBody>
+      </p:sp>
+      <p:sp>
+        <p:nvSpPr>
+          <p:cNvPr id="15" name="Left-Right-Up Arrow 14"/>
+          <p:cNvSpPr/>
+          <p:nvPr/>
+        </p:nvSpPr>
+        <p:spPr>
+          <a:xfrm rot="16200000">
+            <a:off x="5942308" y="2432783"/>
+            <a:ext cx="1371604" cy="815222"/>
+          </a:xfrm>
+          <a:prstGeom prst="leftRightUpArrow">
+            <a:avLst>
+              <a:gd name="adj1" fmla="val 14677"/>
+              <a:gd name="adj2" fmla="val 14776"/>
+              <a:gd name="adj3" fmla="val 25000"/>
+            </a:avLst>
+          </a:prstGeom>
+        </p:spPr>
+        <p:style>
+          <a:lnRef idx="1">
+            <a:schemeClr val="accent1"/>
+          </a:lnRef>
+          <a:fillRef idx="3">
+            <a:schemeClr val="accent1"/>
+          </a:fillRef>
+          <a:effectRef idx="2">
+            <a:schemeClr val="accent1"/>
+          </a:effectRef>
+          <a:fontRef idx="minor">
+            <a:schemeClr val="lt1"/>
+          </a:fontRef>
+        </p:style>
+        <p:txBody>
+          <a:bodyPr rtlCol="0" anchor="ctr"/>
+          <a:lstStyle/>
+          <a:p>
+            <a:pPr algn="ctr"/>
+            <a:endParaRPr lang="en-US"/>
+          </a:p>
+        </p:txBody>
+      </p:sp>
+      <p:sp>
+        <p:nvSpPr>
+          <p:cNvPr id="19" name="Rounded Rectangle 18"/>
+          <p:cNvSpPr/>
+          <p:nvPr/>
+        </p:nvSpPr>
+        <p:spPr>
+          <a:xfrm>
+            <a:off x="6996240" y="4693841"/>
+            <a:ext cx="1913301" cy="867747"/>
+          </a:xfrm>
+          <a:prstGeom prst="roundRect">
+            <a:avLst/>
+          </a:prstGeom>
+          <a:solidFill>
+            <a:schemeClr val="accent4">
+              <a:lumMod val="75000"/>
+              <a:alpha val="49000"/>
+            </a:schemeClr>
+          </a:solidFill>
+        </p:spPr>
+        <p:style>
+          <a:lnRef idx="1">
+            <a:schemeClr val="accent1"/>
+          </a:lnRef>
+          <a:fillRef idx="3">
+            <a:schemeClr val="accent1"/>
+          </a:fillRef>
+          <a:effectRef idx="2">
+            <a:schemeClr val="accent1"/>
+          </a:effectRef>
+          <a:fontRef idx="minor">
+            <a:schemeClr val="lt1"/>
+          </a:fontRef>
+        </p:style>
+        <p:txBody>
+          <a:bodyPr rtlCol="0" anchor="ctr"/>
+          <a:lstStyle/>
+          <a:p>
+            <a:pPr algn="ctr"/>
+            <a:r>
+              <a:rPr lang="en-US" dirty="0" smtClean="0">
+                <a:solidFill>
+                  <a:schemeClr val="bg2">
+                    <a:lumMod val="25000"/>
+                  </a:schemeClr>
+                </a:solidFill>
+              </a:rPr>
+              <a:t>NIEM Exchanges</a:t>
+            </a:r>
+          </a:p>
+          <a:p>
+            <a:pPr algn="ctr"/>
+            <a:r>
+              <a:rPr lang="en-US" dirty="0" smtClean="0">
+                <a:solidFill>
+                  <a:schemeClr val="bg2">
+                    <a:lumMod val="25000"/>
+                  </a:schemeClr>
+                </a:solidFill>
+              </a:rPr>
+              <a:t>EDXL / CAP</a:t>
+            </a:r>
+            <a:endParaRPr lang="en-US" dirty="0">
+              <a:solidFill>
+                <a:schemeClr val="bg2">
+                  <a:lumMod val="25000"/>
+                </a:schemeClr>
+              </a:solidFill>
+            </a:endParaRPr>
+          </a:p>
+        </p:txBody>
+      </p:sp>
+      <p:sp>
+        <p:nvSpPr>
+          <p:cNvPr id="27" name="Rounded Rectangle 26"/>
+          <p:cNvSpPr/>
+          <p:nvPr/>
+        </p:nvSpPr>
+        <p:spPr>
+          <a:xfrm>
+            <a:off x="3878079" y="4122219"/>
+            <a:ext cx="1582563" cy="2010990"/>
+          </a:xfrm>
+          <a:prstGeom prst="roundRect">
+            <a:avLst/>
+          </a:prstGeom>
+          <a:solidFill>
+            <a:schemeClr val="accent4">
+              <a:lumMod val="75000"/>
+              <a:alpha val="49000"/>
+            </a:schemeClr>
+          </a:solidFill>
+        </p:spPr>
+        <p:style>
+          <a:lnRef idx="1">
+            <a:schemeClr val="accent1"/>
+          </a:lnRef>
+          <a:fillRef idx="3">
+            <a:schemeClr val="accent1"/>
+          </a:fillRef>
+          <a:effectRef idx="2">
+            <a:schemeClr val="accent1"/>
+          </a:effectRef>
+          <a:fontRef idx="minor">
+            <a:schemeClr val="lt1"/>
+          </a:fontRef>
+        </p:style>
+        <p:txBody>
+          <a:bodyPr rtlCol="0" anchor="ctr"/>
+          <a:lstStyle/>
+          <a:p>
+            <a:pPr algn="ctr"/>
+            <a:r>
+              <a:rPr lang="en-US" sz="1400" dirty="0" smtClean="0">
+                <a:solidFill>
+                  <a:schemeClr val="bg2">
+                    <a:lumMod val="25000"/>
+                  </a:schemeClr>
+                </a:solidFill>
+              </a:rPr>
+              <a:t>STIX/</a:t>
+            </a:r>
+            <a:r>
+              <a:rPr lang="en-US" sz="1400" dirty="0" err="1" smtClean="0">
+                <a:solidFill>
+                  <a:schemeClr val="bg2">
+                    <a:lumMod val="25000"/>
+                  </a:schemeClr>
+                </a:solidFill>
+              </a:rPr>
+              <a:t>TAXIICybox</a:t>
+            </a:r>
+            <a:endParaRPr lang="en-US" sz="1400" dirty="0" smtClean="0">
+              <a:solidFill>
+                <a:schemeClr val="bg2">
+                  <a:lumMod val="25000"/>
+                </a:schemeClr>
+              </a:solidFill>
+            </a:endParaRPr>
+          </a:p>
+          <a:p>
+            <a:pPr algn="ctr"/>
+            <a:r>
+              <a:rPr lang="en-US" sz="1400" dirty="0" smtClean="0">
+                <a:solidFill>
+                  <a:schemeClr val="bg2">
+                    <a:lumMod val="25000"/>
+                  </a:schemeClr>
+                </a:solidFill>
+              </a:rPr>
+              <a:t>IODEF</a:t>
+            </a:r>
+            <a:endParaRPr lang="en-US" sz="1400" dirty="0" smtClean="0">
+              <a:solidFill>
+                <a:schemeClr val="bg2">
+                  <a:lumMod val="25000"/>
+                </a:schemeClr>
+              </a:solidFill>
+            </a:endParaRPr>
+          </a:p>
+          <a:p>
+            <a:pPr algn="ctr"/>
+            <a:r>
+              <a:rPr lang="en-US" sz="1400" dirty="0" smtClean="0">
+                <a:solidFill>
+                  <a:schemeClr val="bg2">
+                    <a:lumMod val="25000"/>
+                  </a:schemeClr>
+                </a:solidFill>
+              </a:rPr>
+              <a:t>ISO</a:t>
+            </a:r>
+          </a:p>
+          <a:p>
+            <a:pPr algn="ctr"/>
+            <a:r>
+              <a:rPr lang="en-US" sz="1400" dirty="0" smtClean="0">
+                <a:solidFill>
+                  <a:schemeClr val="bg2">
+                    <a:lumMod val="25000"/>
+                  </a:schemeClr>
+                </a:solidFill>
+              </a:rPr>
+              <a:t>NIST</a:t>
+            </a:r>
+          </a:p>
+          <a:p>
+            <a:pPr algn="ctr"/>
+            <a:r>
+              <a:rPr lang="en-US" sz="1400" dirty="0" smtClean="0">
+                <a:solidFill>
+                  <a:schemeClr val="bg2">
+                    <a:lumMod val="25000"/>
+                  </a:schemeClr>
+                </a:solidFill>
+              </a:rPr>
+              <a:t>Others…</a:t>
+            </a:r>
+            <a:endParaRPr lang="en-US" sz="1400" dirty="0">
+              <a:solidFill>
+                <a:schemeClr val="bg2">
+                  <a:lumMod val="25000"/>
+                </a:schemeClr>
+              </a:solidFill>
+            </a:endParaRPr>
+          </a:p>
+        </p:txBody>
+      </p:sp>
+      <p:sp>
+        <p:nvSpPr>
+          <p:cNvPr id="29" name="Up Arrow 28"/>
+          <p:cNvSpPr/>
+          <p:nvPr/>
+        </p:nvSpPr>
+        <p:spPr>
+          <a:xfrm>
+            <a:off x="7819930" y="3527515"/>
+            <a:ext cx="265922" cy="1166326"/>
+          </a:xfrm>
+          <a:prstGeom prst="upArrow">
+            <a:avLst/>
+          </a:prstGeom>
+          <a:gradFill>
+            <a:gsLst>
+              <a:gs pos="0">
+                <a:schemeClr val="accent1">
+                  <a:tint val="100000"/>
+                  <a:shade val="100000"/>
+                  <a:satMod val="130000"/>
+                  <a:alpha val="27000"/>
+                </a:schemeClr>
+              </a:gs>
+              <a:gs pos="100000">
+                <a:schemeClr val="accent1">
+                  <a:tint val="50000"/>
+                  <a:shade val="100000"/>
+                  <a:satMod val="350000"/>
+                </a:schemeClr>
+              </a:gs>
+            </a:gsLst>
+          </a:gradFill>
+        </p:spPr>
+        <p:style>
+          <a:lnRef idx="1">
+            <a:schemeClr val="accent1"/>
+          </a:lnRef>
+          <a:fillRef idx="3">
+            <a:schemeClr val="accent1"/>
+          </a:fillRef>
+          <a:effectRef idx="2">
+            <a:schemeClr val="accent1"/>
+          </a:effectRef>
+          <a:fontRef idx="minor">
+            <a:schemeClr val="lt1"/>
+          </a:fontRef>
+        </p:style>
+        <p:txBody>
+          <a:bodyPr rtlCol="0" anchor="ctr"/>
+          <a:lstStyle/>
+          <a:p>
+            <a:pPr algn="ctr"/>
+            <a:endParaRPr lang="en-US"/>
+          </a:p>
+        </p:txBody>
+      </p:sp>
+      <p:sp>
+        <p:nvSpPr>
+          <p:cNvPr id="18" name="Rectangle 17"/>
+          <p:cNvSpPr/>
+          <p:nvPr/>
+        </p:nvSpPr>
+        <p:spPr>
+          <a:xfrm>
+            <a:off x="4542070" y="1744045"/>
+            <a:ext cx="4172721" cy="410547"/>
+          </a:xfrm>
+          <a:prstGeom prst="rect">
+            <a:avLst/>
+          </a:prstGeom>
+        </p:spPr>
+        <p:style>
+          <a:lnRef idx="1">
+            <a:schemeClr val="accent1"/>
+          </a:lnRef>
+          <a:fillRef idx="3">
+            <a:schemeClr val="accent1"/>
+          </a:fillRef>
+          <a:effectRef idx="2">
+            <a:schemeClr val="accent1"/>
+          </a:effectRef>
+          <a:fontRef idx="minor">
+            <a:schemeClr val="lt1"/>
+          </a:fontRef>
+        </p:style>
+        <p:txBody>
+          <a:bodyPr rtlCol="0" anchor="ctr"/>
+          <a:lstStyle/>
+          <a:p>
+            <a:pPr algn="ctr"/>
+            <a:r>
+              <a:rPr lang="en-US" dirty="0" smtClean="0"/>
+              <a:t>Operation &amp; Execution</a:t>
+            </a:r>
+            <a:endParaRPr lang="en-US" dirty="0"/>
+          </a:p>
+        </p:txBody>
+      </p:sp>
+      <p:sp>
+        <p:nvSpPr>
+          <p:cNvPr id="21" name="Rectangle 20"/>
+          <p:cNvSpPr/>
+          <p:nvPr/>
+        </p:nvSpPr>
+        <p:spPr>
+          <a:xfrm>
+            <a:off x="485192" y="1744360"/>
+            <a:ext cx="3923917" cy="410547"/>
+          </a:xfrm>
+          <a:prstGeom prst="rect">
+            <a:avLst/>
+          </a:prstGeom>
+          <a:gradFill>
+            <a:gsLst>
+              <a:gs pos="7000">
+                <a:schemeClr val="accent1">
+                  <a:shade val="51000"/>
+                  <a:satMod val="130000"/>
+                  <a:alpha val="5000"/>
+                </a:schemeClr>
+              </a:gs>
+              <a:gs pos="100000">
+                <a:schemeClr val="accent1">
+                  <a:shade val="93000"/>
+                  <a:satMod val="130000"/>
+                  <a:alpha val="68000"/>
+                </a:schemeClr>
+              </a:gs>
+              <a:gs pos="100000">
+                <a:schemeClr val="accent1">
+                  <a:shade val="94000"/>
+                  <a:satMod val="135000"/>
+                </a:schemeClr>
+              </a:gs>
+            </a:gsLst>
+          </a:gradFill>
+        </p:spPr>
+        <p:style>
+          <a:lnRef idx="1">
+            <a:schemeClr val="accent1"/>
+          </a:lnRef>
+          <a:fillRef idx="3">
+            <a:schemeClr val="accent1"/>
+          </a:fillRef>
+          <a:effectRef idx="2">
+            <a:schemeClr val="accent1"/>
+          </a:effectRef>
+          <a:fontRef idx="minor">
+            <a:schemeClr val="lt1"/>
+          </a:fontRef>
+        </p:style>
+        <p:txBody>
+          <a:bodyPr rtlCol="0" anchor="ctr"/>
+          <a:lstStyle/>
+          <a:p>
+            <a:pPr algn="ctr"/>
+            <a:r>
+              <a:rPr lang="en-US" dirty="0" smtClean="0"/>
+              <a:t>Strategy &amp; Planning</a:t>
+            </a:r>
+            <a:endParaRPr lang="en-US" dirty="0"/>
+          </a:p>
+        </p:txBody>
+      </p:sp>
+      <p:sp>
+        <p:nvSpPr>
+          <p:cNvPr id="22" name="Up Arrow 21"/>
+          <p:cNvSpPr/>
+          <p:nvPr/>
+        </p:nvSpPr>
+        <p:spPr>
+          <a:xfrm>
+            <a:off x="4409109" y="2971019"/>
+            <a:ext cx="265922" cy="1166326"/>
+          </a:xfrm>
+          <a:prstGeom prst="upArrow">
+            <a:avLst/>
+          </a:prstGeom>
+          <a:gradFill>
+            <a:gsLst>
+              <a:gs pos="0">
+                <a:schemeClr val="accent1">
+                  <a:tint val="100000"/>
+                  <a:shade val="100000"/>
+                  <a:satMod val="130000"/>
+                  <a:alpha val="27000"/>
+                </a:schemeClr>
+              </a:gs>
+              <a:gs pos="100000">
+                <a:schemeClr val="accent1">
+                  <a:tint val="50000"/>
+                  <a:shade val="100000"/>
+                  <a:satMod val="350000"/>
+                </a:schemeClr>
+              </a:gs>
+            </a:gsLst>
+          </a:gradFill>
+        </p:spPr>
+        <p:style>
+          <a:lnRef idx="1">
+            <a:schemeClr val="accent1"/>
+          </a:lnRef>
+          <a:fillRef idx="3">
+            <a:schemeClr val="accent1"/>
+          </a:fillRef>
+          <a:effectRef idx="2">
+            <a:schemeClr val="accent1"/>
+          </a:effectRef>
+          <a:fontRef idx="minor">
+            <a:schemeClr val="lt1"/>
+          </a:fontRef>
+        </p:style>
+        <p:txBody>
+          <a:bodyPr rtlCol="0" anchor="ctr"/>
+          <a:lstStyle/>
+          <a:p>
+            <a:pPr algn="ctr"/>
+            <a:endParaRPr lang="en-US"/>
+          </a:p>
+        </p:txBody>
+      </p:sp>
+      <p:sp>
+        <p:nvSpPr>
+          <p:cNvPr id="25" name="Rounded Rectangle 24"/>
+          <p:cNvSpPr/>
+          <p:nvPr/>
+        </p:nvSpPr>
+        <p:spPr>
+          <a:xfrm>
+            <a:off x="1165182" y="4110678"/>
+            <a:ext cx="1355271" cy="2010990"/>
+          </a:xfrm>
+          <a:prstGeom prst="roundRect">
+            <a:avLst/>
+          </a:prstGeom>
+          <a:solidFill>
+            <a:schemeClr val="accent4">
+              <a:lumMod val="75000"/>
+              <a:alpha val="49000"/>
+            </a:schemeClr>
+          </a:solidFill>
+        </p:spPr>
+        <p:style>
+          <a:lnRef idx="1">
+            <a:schemeClr val="accent1"/>
+          </a:lnRef>
+          <a:fillRef idx="3">
+            <a:schemeClr val="accent1"/>
+          </a:fillRef>
+          <a:effectRef idx="2">
+            <a:schemeClr val="accent1"/>
+          </a:effectRef>
+          <a:fontRef idx="minor">
+            <a:schemeClr val="lt1"/>
+          </a:fontRef>
+        </p:style>
+        <p:txBody>
+          <a:bodyPr rtlCol="0" anchor="ctr"/>
+          <a:lstStyle/>
+          <a:p>
+            <a:pPr algn="ctr"/>
+            <a:r>
+              <a:rPr lang="en-US" sz="1400" dirty="0" smtClean="0">
+                <a:solidFill>
+                  <a:schemeClr val="bg2">
+                    <a:lumMod val="25000"/>
+                  </a:schemeClr>
+                </a:solidFill>
+              </a:rPr>
+              <a:t>SACM</a:t>
+            </a:r>
+            <a:endParaRPr lang="en-US" sz="1400" dirty="0" smtClean="0">
+              <a:solidFill>
+                <a:schemeClr val="bg2">
+                  <a:lumMod val="25000"/>
+                </a:schemeClr>
+              </a:solidFill>
+            </a:endParaRPr>
+          </a:p>
+          <a:p>
+            <a:pPr algn="ctr"/>
+            <a:r>
+              <a:rPr lang="en-US" sz="1400" dirty="0" smtClean="0">
+                <a:solidFill>
+                  <a:schemeClr val="bg2">
+                    <a:lumMod val="25000"/>
+                  </a:schemeClr>
+                </a:solidFill>
+              </a:rPr>
+              <a:t>ISO</a:t>
+            </a:r>
+          </a:p>
+          <a:p>
+            <a:pPr algn="ctr"/>
+            <a:r>
+              <a:rPr lang="en-US" sz="1400" dirty="0" smtClean="0">
+                <a:solidFill>
+                  <a:schemeClr val="bg2">
+                    <a:lumMod val="25000"/>
+                  </a:schemeClr>
+                </a:solidFill>
+              </a:rPr>
+              <a:t>BMM</a:t>
+            </a:r>
+            <a:endParaRPr lang="en-US" sz="1400" dirty="0" smtClean="0">
+              <a:solidFill>
+                <a:schemeClr val="bg2">
+                  <a:lumMod val="25000"/>
+                </a:schemeClr>
+              </a:solidFill>
+            </a:endParaRPr>
+          </a:p>
+          <a:p>
+            <a:pPr algn="ctr"/>
+            <a:r>
+              <a:rPr lang="en-US" sz="1400" dirty="0" smtClean="0">
+                <a:solidFill>
+                  <a:schemeClr val="bg2">
+                    <a:lumMod val="25000"/>
+                  </a:schemeClr>
+                </a:solidFill>
+              </a:rPr>
+              <a:t>Others</a:t>
+            </a:r>
+            <a:r>
+              <a:rPr lang="en-US" sz="1400" dirty="0" smtClean="0">
+                <a:solidFill>
+                  <a:schemeClr val="bg2">
+                    <a:lumMod val="25000"/>
+                  </a:schemeClr>
+                </a:solidFill>
+              </a:rPr>
+              <a:t>…</a:t>
+            </a:r>
+            <a:endParaRPr lang="en-US" sz="1400" dirty="0">
+              <a:solidFill>
+                <a:schemeClr val="bg2">
+                  <a:lumMod val="25000"/>
+                </a:schemeClr>
+              </a:solidFill>
+            </a:endParaRPr>
+          </a:p>
+        </p:txBody>
+      </p:sp>
+      <p:sp>
+        <p:nvSpPr>
+          <p:cNvPr id="31" name="Up Arrow 30"/>
+          <p:cNvSpPr/>
+          <p:nvPr/>
+        </p:nvSpPr>
+        <p:spPr>
+          <a:xfrm>
+            <a:off x="1709856" y="2154591"/>
+            <a:ext cx="265922" cy="1980120"/>
+          </a:xfrm>
+          <a:prstGeom prst="upArrow">
+            <a:avLst/>
+          </a:prstGeom>
+          <a:gradFill>
+            <a:gsLst>
+              <a:gs pos="0">
+                <a:schemeClr val="accent1">
+                  <a:tint val="100000"/>
+                  <a:shade val="100000"/>
+                  <a:satMod val="130000"/>
+                  <a:alpha val="27000"/>
+                </a:schemeClr>
+              </a:gs>
+              <a:gs pos="100000">
+                <a:schemeClr val="accent1">
+                  <a:tint val="50000"/>
+                  <a:shade val="100000"/>
+                  <a:satMod val="350000"/>
+                </a:schemeClr>
+              </a:gs>
+            </a:gsLst>
+          </a:gradFill>
+        </p:spPr>
+        <p:style>
+          <a:lnRef idx="1">
+            <a:schemeClr val="accent1"/>
+          </a:lnRef>
+          <a:fillRef idx="3">
+            <a:schemeClr val="accent1"/>
+          </a:fillRef>
+          <a:effectRef idx="2">
+            <a:schemeClr val="accent1"/>
+          </a:effectRef>
+          <a:fontRef idx="minor">
+            <a:schemeClr val="lt1"/>
+          </a:fontRef>
+        </p:style>
+        <p:txBody>
+          <a:bodyPr rtlCol="0" anchor="ctr"/>
+          <a:lstStyle/>
+          <a:p>
+            <a:pPr algn="ctr"/>
+            <a:endParaRPr lang="en-US"/>
+          </a:p>
+        </p:txBody>
+      </p:sp>
+    </p:spTree>
+    <p:extLst>
+      <p:ext uri="{BB962C8B-B14F-4D97-AF65-F5344CB8AC3E}">
+        <p14:creationId xmlns:p14="http://schemas.microsoft.com/office/powerpoint/2010/main" val="3309402031"/>
       </p:ext>
     </p:extLst>
   </p:cSld>

</xml_diff>

<commit_message>
Updated RFP per comments
</commit_message>
<xml_diff>
--- a/docs/RFP/Threat-Risk RFP Pictures.pptx
+++ b/docs/RFP/Threat-Risk RFP Pictures.pptx
@@ -8,6 +8,7 @@
     <p:sldId id="256" r:id="rId2"/>
     <p:sldId id="257" r:id="rId3"/>
     <p:sldId id="258" r:id="rId4"/>
+    <p:sldId id="259" r:id="rId5"/>
   </p:sldIdLst>
   <p:sldSz cx="9144000" cy="6858000" type="screen4x3"/>
   <p:notesSz cx="6858000" cy="9144000"/>
@@ -290,7 +291,7 @@
           <a:p>
             <a:fld id="{AFD66651-D9BC-4BF5-827C-0F78836D3353}" type="datetimeFigureOut">
               <a:rPr lang="en-US" smtClean="0"/>
-              <a:t>5/17/2014</a:t>
+              <a:t>6/6/2014</a:t>
             </a:fld>
             <a:endParaRPr lang="en-US"/>
           </a:p>
@@ -460,7 +461,7 @@
           <a:p>
             <a:fld id="{AFD66651-D9BC-4BF5-827C-0F78836D3353}" type="datetimeFigureOut">
               <a:rPr lang="en-US" smtClean="0"/>
-              <a:t>5/17/2014</a:t>
+              <a:t>6/6/2014</a:t>
             </a:fld>
             <a:endParaRPr lang="en-US"/>
           </a:p>
@@ -640,7 +641,7 @@
           <a:p>
             <a:fld id="{AFD66651-D9BC-4BF5-827C-0F78836D3353}" type="datetimeFigureOut">
               <a:rPr lang="en-US" smtClean="0"/>
-              <a:t>5/17/2014</a:t>
+              <a:t>6/6/2014</a:t>
             </a:fld>
             <a:endParaRPr lang="en-US"/>
           </a:p>
@@ -810,7 +811,7 @@
           <a:p>
             <a:fld id="{AFD66651-D9BC-4BF5-827C-0F78836D3353}" type="datetimeFigureOut">
               <a:rPr lang="en-US" smtClean="0"/>
-              <a:t>5/17/2014</a:t>
+              <a:t>6/6/2014</a:t>
             </a:fld>
             <a:endParaRPr lang="en-US"/>
           </a:p>
@@ -1056,7 +1057,7 @@
           <a:p>
             <a:fld id="{AFD66651-D9BC-4BF5-827C-0F78836D3353}" type="datetimeFigureOut">
               <a:rPr lang="en-US" smtClean="0"/>
-              <a:t>5/17/2014</a:t>
+              <a:t>6/6/2014</a:t>
             </a:fld>
             <a:endParaRPr lang="en-US"/>
           </a:p>
@@ -1344,7 +1345,7 @@
           <a:p>
             <a:fld id="{AFD66651-D9BC-4BF5-827C-0F78836D3353}" type="datetimeFigureOut">
               <a:rPr lang="en-US" smtClean="0"/>
-              <a:t>5/17/2014</a:t>
+              <a:t>6/6/2014</a:t>
             </a:fld>
             <a:endParaRPr lang="en-US"/>
           </a:p>
@@ -1766,7 +1767,7 @@
           <a:p>
             <a:fld id="{AFD66651-D9BC-4BF5-827C-0F78836D3353}" type="datetimeFigureOut">
               <a:rPr lang="en-US" smtClean="0"/>
-              <a:t>5/17/2014</a:t>
+              <a:t>6/6/2014</a:t>
             </a:fld>
             <a:endParaRPr lang="en-US"/>
           </a:p>
@@ -1884,7 +1885,7 @@
           <a:p>
             <a:fld id="{AFD66651-D9BC-4BF5-827C-0F78836D3353}" type="datetimeFigureOut">
               <a:rPr lang="en-US" smtClean="0"/>
-              <a:t>5/17/2014</a:t>
+              <a:t>6/6/2014</a:t>
             </a:fld>
             <a:endParaRPr lang="en-US"/>
           </a:p>
@@ -1979,7 +1980,7 @@
           <a:p>
             <a:fld id="{AFD66651-D9BC-4BF5-827C-0F78836D3353}" type="datetimeFigureOut">
               <a:rPr lang="en-US" smtClean="0"/>
-              <a:t>5/17/2014</a:t>
+              <a:t>6/6/2014</a:t>
             </a:fld>
             <a:endParaRPr lang="en-US"/>
           </a:p>
@@ -2256,7 +2257,7 @@
           <a:p>
             <a:fld id="{AFD66651-D9BC-4BF5-827C-0F78836D3353}" type="datetimeFigureOut">
               <a:rPr lang="en-US" smtClean="0"/>
-              <a:t>5/17/2014</a:t>
+              <a:t>6/6/2014</a:t>
             </a:fld>
             <a:endParaRPr lang="en-US"/>
           </a:p>
@@ -2509,7 +2510,7 @@
           <a:p>
             <a:fld id="{AFD66651-D9BC-4BF5-827C-0F78836D3353}" type="datetimeFigureOut">
               <a:rPr lang="en-US" smtClean="0"/>
-              <a:t>5/17/2014</a:t>
+              <a:t>6/6/2014</a:t>
             </a:fld>
             <a:endParaRPr lang="en-US"/>
           </a:p>
@@ -2722,7 +2723,7 @@
           <a:p>
             <a:fld id="{AFD66651-D9BC-4BF5-827C-0F78836D3353}" type="datetimeFigureOut">
               <a:rPr lang="en-US" smtClean="0"/>
-              <a:t>5/17/2014</a:t>
+              <a:t>6/6/2014</a:t>
             </a:fld>
             <a:endParaRPr lang="en-US"/>
           </a:p>
@@ -4943,8 +4944,11 @@
                   </a:schemeClr>
                 </a:solidFill>
               </a:rPr>
-              <a:t>Legal </a:t>
-            </a:r>
+              <a:t>Legal Risk</a:t>
+            </a:r>
+          </a:p>
+          <a:p>
+            <a:pPr algn="ctr"/>
             <a:r>
               <a:rPr lang="en-US" sz="1400" dirty="0" smtClean="0">
                 <a:solidFill>
@@ -4953,48 +4957,28 @@
                   </a:schemeClr>
                 </a:solidFill>
               </a:rPr>
-              <a:t>Risk</a:t>
-            </a:r>
-          </a:p>
-          <a:p>
-            <a:pPr algn="ctr"/>
-            <a:r>
-              <a:rPr lang="en-US" sz="1400" dirty="0" smtClean="0">
+              <a:t>Project </a:t>
+            </a:r>
+            <a:r>
+              <a:rPr lang="en-US" sz="1400" dirty="0" err="1" smtClean="0">
                 <a:solidFill>
                   <a:schemeClr val="bg2">
                     <a:lumMod val="25000"/>
                   </a:schemeClr>
                 </a:solidFill>
               </a:rPr>
-              <a:t>Project </a:t>
-            </a:r>
-            <a:r>
-              <a:rPr lang="en-US" sz="1400" dirty="0" err="1" smtClean="0">
+              <a:t>Mgmt</a:t>
+            </a:r>
+            <a:r>
+              <a:rPr lang="en-US" sz="1400" dirty="0" smtClean="0">
                 <a:solidFill>
                   <a:schemeClr val="bg2">
                     <a:lumMod val="25000"/>
                   </a:schemeClr>
                 </a:solidFill>
               </a:rPr>
-              <a:t>Mgmt</a:t>
-            </a:r>
-            <a:r>
-              <a:rPr lang="en-US" sz="1400" dirty="0" smtClean="0">
-                <a:solidFill>
-                  <a:schemeClr val="bg2">
-                    <a:lumMod val="25000"/>
-                  </a:schemeClr>
-                </a:solidFill>
-              </a:rPr>
               <a:t> Risk</a:t>
             </a:r>
-            <a:endParaRPr lang="en-US" sz="1400" dirty="0" smtClean="0">
-              <a:solidFill>
-                <a:schemeClr val="bg2">
-                  <a:lumMod val="25000"/>
-                </a:schemeClr>
-              </a:solidFill>
-            </a:endParaRPr>
           </a:p>
         </p:txBody>
       </p:sp>
@@ -5059,6 +5043,1412 @@
     <p:extLst>
       <p:ext uri="{BB962C8B-B14F-4D97-AF65-F5344CB8AC3E}">
         <p14:creationId xmlns:p14="http://schemas.microsoft.com/office/powerpoint/2010/main" val="3309402031"/>
+      </p:ext>
+    </p:extLst>
+  </p:cSld>
+  <p:clrMapOvr>
+    <a:masterClrMapping/>
+  </p:clrMapOvr>
+  <p:timing>
+    <p:tnLst>
+      <p:par>
+        <p:cTn id="1" dur="indefinite" restart="never" nodeType="tmRoot"/>
+      </p:par>
+    </p:tnLst>
+  </p:timing>
+</p:sld>
+</file>
+
+<file path=ppt/slides/slide4.xml><?xml version="1.0" encoding="utf-8"?>
+<p:sld xmlns:a="http://schemas.openxmlformats.org/drawingml/2006/main" xmlns:r="http://schemas.openxmlformats.org/officeDocument/2006/relationships" xmlns:p="http://schemas.openxmlformats.org/presentationml/2006/main">
+  <p:cSld>
+    <p:spTree>
+      <p:nvGrpSpPr>
+        <p:cNvPr id="1" name=""/>
+        <p:cNvGrpSpPr/>
+        <p:nvPr/>
+      </p:nvGrpSpPr>
+      <p:grpSpPr>
+        <a:xfrm>
+          <a:off x="0" y="0"/>
+          <a:ext cx="0" cy="0"/>
+          <a:chOff x="0" y="0"/>
+          <a:chExt cx="0" cy="0"/>
+        </a:xfrm>
+      </p:grpSpPr>
+      <p:sp>
+        <p:nvSpPr>
+          <p:cNvPr id="5" name="Rectangle 4"/>
+          <p:cNvSpPr/>
+          <p:nvPr/>
+        </p:nvSpPr>
+        <p:spPr>
+          <a:xfrm>
+            <a:off x="201890" y="363709"/>
+            <a:ext cx="8594768" cy="410547"/>
+          </a:xfrm>
+          <a:prstGeom prst="rect">
+            <a:avLst/>
+          </a:prstGeom>
+        </p:spPr>
+        <p:style>
+          <a:lnRef idx="1">
+            <a:schemeClr val="accent1"/>
+          </a:lnRef>
+          <a:fillRef idx="3">
+            <a:schemeClr val="accent1"/>
+          </a:fillRef>
+          <a:effectRef idx="2">
+            <a:schemeClr val="accent1"/>
+          </a:effectRef>
+          <a:fontRef idx="minor">
+            <a:schemeClr val="lt1"/>
+          </a:fontRef>
+        </p:style>
+        <p:txBody>
+          <a:bodyPr rtlCol="0" anchor="ctr"/>
+          <a:lstStyle/>
+          <a:p>
+            <a:pPr algn="ctr"/>
+            <a:r>
+              <a:rPr lang="en-US" dirty="0" smtClean="0"/>
+              <a:t>Wide &amp; shallow conceptual model generically covering threats and risks</a:t>
+            </a:r>
+            <a:endParaRPr lang="en-US" dirty="0"/>
+          </a:p>
+        </p:txBody>
+      </p:sp>
+      <p:sp>
+        <p:nvSpPr>
+          <p:cNvPr id="6" name="Rectangle 5"/>
+          <p:cNvSpPr/>
+          <p:nvPr/>
+        </p:nvSpPr>
+        <p:spPr>
+          <a:xfrm>
+            <a:off x="2922645" y="1187448"/>
+            <a:ext cx="2156971" cy="836589"/>
+          </a:xfrm>
+          <a:prstGeom prst="rect">
+            <a:avLst/>
+          </a:prstGeom>
+        </p:spPr>
+        <p:style>
+          <a:lnRef idx="1">
+            <a:schemeClr val="accent1"/>
+          </a:lnRef>
+          <a:fillRef idx="3">
+            <a:schemeClr val="accent1"/>
+          </a:fillRef>
+          <a:effectRef idx="2">
+            <a:schemeClr val="accent1"/>
+          </a:effectRef>
+          <a:fontRef idx="minor">
+            <a:schemeClr val="lt1"/>
+          </a:fontRef>
+        </p:style>
+        <p:txBody>
+          <a:bodyPr rtlCol="0" anchor="ctr"/>
+          <a:lstStyle/>
+          <a:p>
+            <a:pPr algn="ctr"/>
+            <a:r>
+              <a:rPr lang="en-US" dirty="0" smtClean="0"/>
+              <a:t>High level Cyber-threat/risk concepts</a:t>
+            </a:r>
+            <a:endParaRPr lang="en-US" dirty="0"/>
+          </a:p>
+        </p:txBody>
+      </p:sp>
+      <p:sp>
+        <p:nvSpPr>
+          <p:cNvPr id="10" name="Rectangle 9"/>
+          <p:cNvSpPr/>
+          <p:nvPr/>
+        </p:nvSpPr>
+        <p:spPr>
+          <a:xfrm>
+            <a:off x="6212952" y="1187449"/>
+            <a:ext cx="1291853" cy="1371600"/>
+          </a:xfrm>
+          <a:prstGeom prst="rect">
+            <a:avLst/>
+          </a:prstGeom>
+          <a:solidFill>
+            <a:schemeClr val="accent1">
+              <a:lumMod val="20000"/>
+              <a:lumOff val="80000"/>
+            </a:schemeClr>
+          </a:solidFill>
+        </p:spPr>
+        <p:style>
+          <a:lnRef idx="1">
+            <a:schemeClr val="accent1"/>
+          </a:lnRef>
+          <a:fillRef idx="3">
+            <a:schemeClr val="accent1"/>
+          </a:fillRef>
+          <a:effectRef idx="2">
+            <a:schemeClr val="accent1"/>
+          </a:effectRef>
+          <a:fontRef idx="minor">
+            <a:schemeClr val="lt1"/>
+          </a:fontRef>
+        </p:style>
+        <p:txBody>
+          <a:bodyPr rtlCol="0" anchor="ctr"/>
+          <a:lstStyle/>
+          <a:p>
+            <a:pPr algn="ctr"/>
+            <a:endParaRPr lang="en-US" sz="1400" dirty="0" smtClean="0">
+              <a:solidFill>
+                <a:schemeClr val="bg2">
+                  <a:lumMod val="25000"/>
+                </a:schemeClr>
+              </a:solidFill>
+            </a:endParaRPr>
+          </a:p>
+          <a:p>
+            <a:pPr algn="ctr"/>
+            <a:r>
+              <a:rPr lang="en-US" sz="1400" dirty="0" smtClean="0">
+                <a:solidFill>
+                  <a:schemeClr val="bg2">
+                    <a:lumMod val="25000"/>
+                  </a:schemeClr>
+                </a:solidFill>
+              </a:rPr>
+              <a:t>Law Enforcement / </a:t>
+            </a:r>
+            <a:r>
+              <a:rPr lang="en-US" sz="1400" dirty="0" smtClean="0">
+                <a:solidFill>
+                  <a:schemeClr val="bg2">
+                    <a:lumMod val="25000"/>
+                  </a:schemeClr>
+                </a:solidFill>
+              </a:rPr>
+              <a:t>Emergency </a:t>
+            </a:r>
+            <a:r>
+              <a:rPr lang="en-US" sz="1400" dirty="0" smtClean="0">
+                <a:solidFill>
+                  <a:schemeClr val="bg2">
+                    <a:lumMod val="25000"/>
+                  </a:schemeClr>
+                </a:solidFill>
+              </a:rPr>
+              <a:t>Management Concepts</a:t>
+            </a:r>
+          </a:p>
+          <a:p>
+            <a:pPr algn="ctr"/>
+            <a:endParaRPr lang="en-US" sz="1400" dirty="0">
+              <a:solidFill>
+                <a:schemeClr val="bg2">
+                  <a:lumMod val="25000"/>
+                </a:schemeClr>
+              </a:solidFill>
+            </a:endParaRPr>
+          </a:p>
+        </p:txBody>
+      </p:sp>
+      <p:sp>
+        <p:nvSpPr>
+          <p:cNvPr id="14" name="Rounded Rectangle 13"/>
+          <p:cNvSpPr/>
+          <p:nvPr/>
+        </p:nvSpPr>
+        <p:spPr>
+          <a:xfrm>
+            <a:off x="4507686" y="2557730"/>
+            <a:ext cx="1705265" cy="867747"/>
+          </a:xfrm>
+          <a:prstGeom prst="roundRect">
+            <a:avLst/>
+          </a:prstGeom>
+          <a:solidFill>
+            <a:schemeClr val="accent1">
+              <a:lumMod val="75000"/>
+            </a:schemeClr>
+          </a:solidFill>
+        </p:spPr>
+        <p:style>
+          <a:lnRef idx="1">
+            <a:schemeClr val="accent1"/>
+          </a:lnRef>
+          <a:fillRef idx="3">
+            <a:schemeClr val="accent1"/>
+          </a:fillRef>
+          <a:effectRef idx="2">
+            <a:schemeClr val="accent1"/>
+          </a:effectRef>
+          <a:fontRef idx="minor">
+            <a:schemeClr val="lt1"/>
+          </a:fontRef>
+        </p:style>
+        <p:txBody>
+          <a:bodyPr rtlCol="0" anchor="ctr"/>
+          <a:lstStyle/>
+          <a:p>
+            <a:pPr algn="ctr"/>
+            <a:r>
+              <a:rPr lang="en-US" dirty="0" smtClean="0"/>
+              <a:t>NIEM Threat/Risk Representation</a:t>
+            </a:r>
+            <a:endParaRPr lang="en-US" dirty="0"/>
+          </a:p>
+        </p:txBody>
+      </p:sp>
+      <p:sp>
+        <p:nvSpPr>
+          <p:cNvPr id="15" name="Left-Right-Up Arrow 14"/>
+          <p:cNvSpPr/>
+          <p:nvPr/>
+        </p:nvSpPr>
+        <p:spPr>
+          <a:xfrm rot="16200000">
+            <a:off x="4801425" y="1464317"/>
+            <a:ext cx="1371604" cy="815222"/>
+          </a:xfrm>
+          <a:prstGeom prst="leftRightUpArrow">
+            <a:avLst>
+              <a:gd name="adj1" fmla="val 14677"/>
+              <a:gd name="adj2" fmla="val 14776"/>
+              <a:gd name="adj3" fmla="val 25000"/>
+            </a:avLst>
+          </a:prstGeom>
+        </p:spPr>
+        <p:style>
+          <a:lnRef idx="1">
+            <a:schemeClr val="accent1"/>
+          </a:lnRef>
+          <a:fillRef idx="3">
+            <a:schemeClr val="accent1"/>
+          </a:fillRef>
+          <a:effectRef idx="2">
+            <a:schemeClr val="accent1"/>
+          </a:effectRef>
+          <a:fontRef idx="minor">
+            <a:schemeClr val="lt1"/>
+          </a:fontRef>
+        </p:style>
+        <p:txBody>
+          <a:bodyPr rtlCol="0" anchor="ctr"/>
+          <a:lstStyle/>
+          <a:p>
+            <a:pPr algn="ctr"/>
+            <a:endParaRPr lang="en-US"/>
+          </a:p>
+        </p:txBody>
+      </p:sp>
+      <p:sp>
+        <p:nvSpPr>
+          <p:cNvPr id="19" name="Rounded Rectangle 18"/>
+          <p:cNvSpPr/>
+          <p:nvPr/>
+        </p:nvSpPr>
+        <p:spPr>
+          <a:xfrm>
+            <a:off x="6214422" y="4542557"/>
+            <a:ext cx="1195171" cy="867747"/>
+          </a:xfrm>
+          <a:prstGeom prst="roundRect">
+            <a:avLst/>
+          </a:prstGeom>
+          <a:solidFill>
+            <a:schemeClr val="accent4">
+              <a:lumMod val="75000"/>
+              <a:alpha val="49000"/>
+            </a:schemeClr>
+          </a:solidFill>
+        </p:spPr>
+        <p:style>
+          <a:lnRef idx="1">
+            <a:schemeClr val="accent1"/>
+          </a:lnRef>
+          <a:fillRef idx="3">
+            <a:schemeClr val="accent1"/>
+          </a:fillRef>
+          <a:effectRef idx="2">
+            <a:schemeClr val="accent1"/>
+          </a:effectRef>
+          <a:fontRef idx="minor">
+            <a:schemeClr val="lt1"/>
+          </a:fontRef>
+        </p:style>
+        <p:txBody>
+          <a:bodyPr rtlCol="0" anchor="ctr"/>
+          <a:lstStyle/>
+          <a:p>
+            <a:pPr algn="ctr"/>
+            <a:r>
+              <a:rPr lang="en-US" sz="1400" dirty="0" smtClean="0">
+                <a:solidFill>
+                  <a:schemeClr val="bg2">
+                    <a:lumMod val="25000"/>
+                  </a:schemeClr>
+                </a:solidFill>
+              </a:rPr>
+              <a:t>NIEM Exchanges</a:t>
+            </a:r>
+          </a:p>
+          <a:p>
+            <a:pPr algn="ctr"/>
+            <a:r>
+              <a:rPr lang="en-US" sz="1400" dirty="0" smtClean="0">
+                <a:solidFill>
+                  <a:schemeClr val="bg2">
+                    <a:lumMod val="25000"/>
+                  </a:schemeClr>
+                </a:solidFill>
+              </a:rPr>
+              <a:t>EDXL / </a:t>
+            </a:r>
+            <a:r>
+              <a:rPr lang="en-US" sz="1400" dirty="0" smtClean="0">
+                <a:solidFill>
+                  <a:schemeClr val="bg2">
+                    <a:lumMod val="25000"/>
+                  </a:schemeClr>
+                </a:solidFill>
+              </a:rPr>
+              <a:t>CAP</a:t>
+            </a:r>
+          </a:p>
+          <a:p>
+            <a:pPr algn="ctr"/>
+            <a:r>
+              <a:rPr lang="en-US" sz="1400" dirty="0" smtClean="0">
+                <a:solidFill>
+                  <a:schemeClr val="bg2">
+                    <a:lumMod val="25000"/>
+                  </a:schemeClr>
+                </a:solidFill>
+              </a:rPr>
+              <a:t>Others…</a:t>
+            </a:r>
+            <a:endParaRPr lang="en-US" sz="1400" dirty="0">
+              <a:solidFill>
+                <a:schemeClr val="bg2">
+                  <a:lumMod val="25000"/>
+                </a:schemeClr>
+              </a:solidFill>
+            </a:endParaRPr>
+          </a:p>
+        </p:txBody>
+      </p:sp>
+      <p:sp>
+        <p:nvSpPr>
+          <p:cNvPr id="27" name="Rounded Rectangle 26"/>
+          <p:cNvSpPr/>
+          <p:nvPr/>
+        </p:nvSpPr>
+        <p:spPr>
+          <a:xfrm>
+            <a:off x="2737196" y="2601900"/>
+            <a:ext cx="1582563" cy="1410437"/>
+          </a:xfrm>
+          <a:prstGeom prst="roundRect">
+            <a:avLst/>
+          </a:prstGeom>
+          <a:solidFill>
+            <a:schemeClr val="accent4">
+              <a:lumMod val="75000"/>
+              <a:alpha val="49000"/>
+            </a:schemeClr>
+          </a:solidFill>
+        </p:spPr>
+        <p:style>
+          <a:lnRef idx="1">
+            <a:schemeClr val="accent1"/>
+          </a:lnRef>
+          <a:fillRef idx="3">
+            <a:schemeClr val="accent1"/>
+          </a:fillRef>
+          <a:effectRef idx="2">
+            <a:schemeClr val="accent1"/>
+          </a:effectRef>
+          <a:fontRef idx="minor">
+            <a:schemeClr val="lt1"/>
+          </a:fontRef>
+        </p:style>
+        <p:txBody>
+          <a:bodyPr rtlCol="0" anchor="ctr"/>
+          <a:lstStyle/>
+          <a:p>
+            <a:pPr algn="ctr"/>
+            <a:r>
+              <a:rPr lang="en-US" sz="1400" dirty="0" smtClean="0">
+                <a:solidFill>
+                  <a:schemeClr val="bg2">
+                    <a:lumMod val="25000"/>
+                  </a:schemeClr>
+                </a:solidFill>
+              </a:rPr>
+              <a:t>STIX/TAXII/Cybox</a:t>
+            </a:r>
+            <a:endParaRPr lang="en-US" sz="1400" dirty="0" smtClean="0">
+              <a:solidFill>
+                <a:schemeClr val="bg2">
+                  <a:lumMod val="25000"/>
+                </a:schemeClr>
+              </a:solidFill>
+            </a:endParaRPr>
+          </a:p>
+          <a:p>
+            <a:pPr algn="ctr"/>
+            <a:r>
+              <a:rPr lang="en-US" sz="1400" dirty="0" smtClean="0">
+                <a:solidFill>
+                  <a:schemeClr val="bg2">
+                    <a:lumMod val="25000"/>
+                  </a:schemeClr>
+                </a:solidFill>
+              </a:rPr>
+              <a:t>IODEF</a:t>
+            </a:r>
+          </a:p>
+          <a:p>
+            <a:pPr algn="ctr"/>
+            <a:r>
+              <a:rPr lang="en-US" sz="1400" dirty="0" smtClean="0">
+                <a:solidFill>
+                  <a:schemeClr val="bg2">
+                    <a:lumMod val="25000"/>
+                  </a:schemeClr>
+                </a:solidFill>
+              </a:rPr>
+              <a:t>SACM</a:t>
+            </a:r>
+          </a:p>
+          <a:p>
+            <a:pPr algn="ctr"/>
+            <a:r>
+              <a:rPr lang="en-US" sz="1400" dirty="0" smtClean="0">
+                <a:solidFill>
+                  <a:schemeClr val="bg2">
+                    <a:lumMod val="25000"/>
+                  </a:schemeClr>
+                </a:solidFill>
+              </a:rPr>
+              <a:t>ISO</a:t>
+            </a:r>
+          </a:p>
+          <a:p>
+            <a:pPr algn="ctr"/>
+            <a:r>
+              <a:rPr lang="en-US" sz="1400" dirty="0" smtClean="0">
+                <a:solidFill>
+                  <a:schemeClr val="bg2">
+                    <a:lumMod val="25000"/>
+                  </a:schemeClr>
+                </a:solidFill>
+              </a:rPr>
+              <a:t>NIST</a:t>
+            </a:r>
+          </a:p>
+          <a:p>
+            <a:pPr algn="ctr"/>
+            <a:r>
+              <a:rPr lang="en-US" sz="1400" dirty="0" smtClean="0">
+                <a:solidFill>
+                  <a:schemeClr val="bg2">
+                    <a:lumMod val="25000"/>
+                  </a:schemeClr>
+                </a:solidFill>
+              </a:rPr>
+              <a:t>Others…</a:t>
+            </a:r>
+            <a:endParaRPr lang="en-US" sz="1400" dirty="0">
+              <a:solidFill>
+                <a:schemeClr val="bg2">
+                  <a:lumMod val="25000"/>
+                </a:schemeClr>
+              </a:solidFill>
+            </a:endParaRPr>
+          </a:p>
+        </p:txBody>
+      </p:sp>
+      <p:sp>
+        <p:nvSpPr>
+          <p:cNvPr id="29" name="Up Arrow 28"/>
+          <p:cNvSpPr/>
+          <p:nvPr/>
+        </p:nvSpPr>
+        <p:spPr>
+          <a:xfrm>
+            <a:off x="6679047" y="2559048"/>
+            <a:ext cx="265922" cy="1983509"/>
+          </a:xfrm>
+          <a:prstGeom prst="upArrow">
+            <a:avLst/>
+          </a:prstGeom>
+          <a:gradFill>
+            <a:gsLst>
+              <a:gs pos="0">
+                <a:schemeClr val="accent1">
+                  <a:tint val="100000"/>
+                  <a:shade val="100000"/>
+                  <a:satMod val="130000"/>
+                  <a:alpha val="27000"/>
+                </a:schemeClr>
+              </a:gs>
+              <a:gs pos="100000">
+                <a:schemeClr val="accent1">
+                  <a:tint val="50000"/>
+                  <a:shade val="100000"/>
+                  <a:satMod val="350000"/>
+                </a:schemeClr>
+              </a:gs>
+            </a:gsLst>
+          </a:gradFill>
+        </p:spPr>
+        <p:style>
+          <a:lnRef idx="1">
+            <a:schemeClr val="accent1"/>
+          </a:lnRef>
+          <a:fillRef idx="3">
+            <a:schemeClr val="accent1"/>
+          </a:fillRef>
+          <a:effectRef idx="2">
+            <a:schemeClr val="accent1"/>
+          </a:effectRef>
+          <a:fontRef idx="minor">
+            <a:schemeClr val="lt1"/>
+          </a:fontRef>
+        </p:style>
+        <p:txBody>
+          <a:bodyPr rtlCol="0" anchor="ctr"/>
+          <a:lstStyle/>
+          <a:p>
+            <a:pPr algn="ctr"/>
+            <a:endParaRPr lang="en-US"/>
+          </a:p>
+        </p:txBody>
+      </p:sp>
+      <p:sp>
+        <p:nvSpPr>
+          <p:cNvPr id="18" name="Rectangle 17"/>
+          <p:cNvSpPr/>
+          <p:nvPr/>
+        </p:nvSpPr>
+        <p:spPr>
+          <a:xfrm>
+            <a:off x="2922644" y="775579"/>
+            <a:ext cx="5874013" cy="410547"/>
+          </a:xfrm>
+          <a:prstGeom prst="rect">
+            <a:avLst/>
+          </a:prstGeom>
+        </p:spPr>
+        <p:style>
+          <a:lnRef idx="1">
+            <a:schemeClr val="accent1"/>
+          </a:lnRef>
+          <a:fillRef idx="3">
+            <a:schemeClr val="accent1"/>
+          </a:fillRef>
+          <a:effectRef idx="2">
+            <a:schemeClr val="accent1"/>
+          </a:effectRef>
+          <a:fontRef idx="minor">
+            <a:schemeClr val="lt1"/>
+          </a:fontRef>
+        </p:style>
+        <p:txBody>
+          <a:bodyPr rtlCol="0" anchor="ctr"/>
+          <a:lstStyle/>
+          <a:p>
+            <a:pPr algn="ctr"/>
+            <a:r>
+              <a:rPr lang="en-US" dirty="0" smtClean="0"/>
+              <a:t>Operational  Threat &amp; Risk Concepts</a:t>
+            </a:r>
+            <a:endParaRPr lang="en-US" dirty="0"/>
+          </a:p>
+        </p:txBody>
+      </p:sp>
+      <p:sp>
+        <p:nvSpPr>
+          <p:cNvPr id="21" name="Rectangle 20"/>
+          <p:cNvSpPr/>
+          <p:nvPr/>
+        </p:nvSpPr>
+        <p:spPr>
+          <a:xfrm>
+            <a:off x="352231" y="774571"/>
+            <a:ext cx="1283463" cy="831171"/>
+          </a:xfrm>
+          <a:prstGeom prst="rect">
+            <a:avLst/>
+          </a:prstGeom>
+          <a:gradFill>
+            <a:gsLst>
+              <a:gs pos="7000">
+                <a:schemeClr val="accent1">
+                  <a:shade val="51000"/>
+                  <a:satMod val="130000"/>
+                  <a:alpha val="5000"/>
+                </a:schemeClr>
+              </a:gs>
+              <a:gs pos="100000">
+                <a:schemeClr val="accent1">
+                  <a:shade val="93000"/>
+                  <a:satMod val="130000"/>
+                  <a:alpha val="68000"/>
+                </a:schemeClr>
+              </a:gs>
+              <a:gs pos="100000">
+                <a:schemeClr val="accent1">
+                  <a:shade val="94000"/>
+                  <a:satMod val="135000"/>
+                </a:schemeClr>
+              </a:gs>
+            </a:gsLst>
+          </a:gradFill>
+        </p:spPr>
+        <p:style>
+          <a:lnRef idx="1">
+            <a:schemeClr val="accent1"/>
+          </a:lnRef>
+          <a:fillRef idx="3">
+            <a:schemeClr val="accent1"/>
+          </a:fillRef>
+          <a:effectRef idx="2">
+            <a:schemeClr val="accent1"/>
+          </a:effectRef>
+          <a:fontRef idx="minor">
+            <a:schemeClr val="lt1"/>
+          </a:fontRef>
+        </p:style>
+        <p:txBody>
+          <a:bodyPr rtlCol="0" anchor="ctr"/>
+          <a:lstStyle/>
+          <a:p>
+            <a:pPr algn="ctr"/>
+            <a:r>
+              <a:rPr lang="en-US" dirty="0" smtClean="0"/>
+              <a:t>Other risks (Out of scope)</a:t>
+            </a:r>
+            <a:endParaRPr lang="en-US" dirty="0"/>
+          </a:p>
+        </p:txBody>
+      </p:sp>
+      <p:sp>
+        <p:nvSpPr>
+          <p:cNvPr id="22" name="Up Arrow 21"/>
+          <p:cNvSpPr/>
+          <p:nvPr/>
+        </p:nvSpPr>
+        <p:spPr>
+          <a:xfrm>
+            <a:off x="3268226" y="2002553"/>
+            <a:ext cx="265922" cy="583163"/>
+          </a:xfrm>
+          <a:prstGeom prst="upArrow">
+            <a:avLst/>
+          </a:prstGeom>
+          <a:gradFill>
+            <a:gsLst>
+              <a:gs pos="0">
+                <a:schemeClr val="accent1">
+                  <a:tint val="100000"/>
+                  <a:shade val="100000"/>
+                  <a:satMod val="130000"/>
+                  <a:alpha val="27000"/>
+                </a:schemeClr>
+              </a:gs>
+              <a:gs pos="100000">
+                <a:schemeClr val="accent1">
+                  <a:tint val="50000"/>
+                  <a:shade val="100000"/>
+                  <a:satMod val="350000"/>
+                </a:schemeClr>
+              </a:gs>
+            </a:gsLst>
+          </a:gradFill>
+        </p:spPr>
+        <p:style>
+          <a:lnRef idx="1">
+            <a:schemeClr val="accent1"/>
+          </a:lnRef>
+          <a:fillRef idx="3">
+            <a:schemeClr val="accent1"/>
+          </a:fillRef>
+          <a:effectRef idx="2">
+            <a:schemeClr val="accent1"/>
+          </a:effectRef>
+          <a:fontRef idx="minor">
+            <a:schemeClr val="lt1"/>
+          </a:fontRef>
+        </p:style>
+        <p:txBody>
+          <a:bodyPr rtlCol="0" anchor="ctr"/>
+          <a:lstStyle/>
+          <a:p>
+            <a:pPr algn="ctr"/>
+            <a:endParaRPr lang="en-US"/>
+          </a:p>
+        </p:txBody>
+      </p:sp>
+      <p:sp>
+        <p:nvSpPr>
+          <p:cNvPr id="16" name="Rounded Rectangle 15"/>
+          <p:cNvSpPr/>
+          <p:nvPr/>
+        </p:nvSpPr>
+        <p:spPr>
+          <a:xfrm>
+            <a:off x="201890" y="3140889"/>
+            <a:ext cx="1695419" cy="2269415"/>
+          </a:xfrm>
+          <a:prstGeom prst="roundRect">
+            <a:avLst/>
+          </a:prstGeom>
+          <a:solidFill>
+            <a:schemeClr val="bg2">
+              <a:lumMod val="90000"/>
+              <a:alpha val="49000"/>
+            </a:schemeClr>
+          </a:solidFill>
+        </p:spPr>
+        <p:style>
+          <a:lnRef idx="1">
+            <a:schemeClr val="accent1"/>
+          </a:lnRef>
+          <a:fillRef idx="3">
+            <a:schemeClr val="accent1"/>
+          </a:fillRef>
+          <a:effectRef idx="2">
+            <a:schemeClr val="accent1"/>
+          </a:effectRef>
+          <a:fontRef idx="minor">
+            <a:schemeClr val="lt1"/>
+          </a:fontRef>
+        </p:style>
+        <p:txBody>
+          <a:bodyPr rtlCol="0" anchor="ctr"/>
+          <a:lstStyle/>
+          <a:p>
+            <a:pPr algn="ctr"/>
+            <a:r>
+              <a:rPr lang="en-US" sz="1400" u="sng" dirty="0" smtClean="0">
+                <a:solidFill>
+                  <a:schemeClr val="bg2">
+                    <a:lumMod val="25000"/>
+                  </a:schemeClr>
+                </a:solidFill>
+              </a:rPr>
+              <a:t>Other Risks</a:t>
+            </a:r>
+          </a:p>
+          <a:p>
+            <a:pPr algn="ctr"/>
+            <a:r>
+              <a:rPr lang="en-US" sz="1400" dirty="0" smtClean="0">
+                <a:solidFill>
+                  <a:schemeClr val="bg2">
+                    <a:lumMod val="25000"/>
+                  </a:schemeClr>
+                </a:solidFill>
+              </a:rPr>
+              <a:t>Systemic Risk</a:t>
+            </a:r>
+          </a:p>
+          <a:p>
+            <a:pPr algn="ctr"/>
+            <a:r>
+              <a:rPr lang="en-US" sz="1400" dirty="0" smtClean="0">
+                <a:solidFill>
+                  <a:schemeClr val="bg2">
+                    <a:lumMod val="25000"/>
+                  </a:schemeClr>
+                </a:solidFill>
+              </a:rPr>
+              <a:t>Credit Risk</a:t>
+            </a:r>
+          </a:p>
+          <a:p>
+            <a:pPr algn="ctr"/>
+            <a:r>
+              <a:rPr lang="en-US" sz="1400" dirty="0" smtClean="0">
+                <a:solidFill>
+                  <a:schemeClr val="bg2">
+                    <a:lumMod val="25000"/>
+                  </a:schemeClr>
+                </a:solidFill>
+              </a:rPr>
+              <a:t>Market Risk</a:t>
+            </a:r>
+          </a:p>
+          <a:p>
+            <a:pPr algn="ctr"/>
+            <a:r>
+              <a:rPr lang="en-US" sz="1400" dirty="0" smtClean="0">
+                <a:solidFill>
+                  <a:schemeClr val="bg2">
+                    <a:lumMod val="25000"/>
+                  </a:schemeClr>
+                </a:solidFill>
+              </a:rPr>
+              <a:t>Pension Risk</a:t>
+            </a:r>
+          </a:p>
+          <a:p>
+            <a:pPr algn="ctr"/>
+            <a:r>
+              <a:rPr lang="en-US" sz="1400" dirty="0" smtClean="0">
+                <a:solidFill>
+                  <a:schemeClr val="bg2">
+                    <a:lumMod val="25000"/>
+                  </a:schemeClr>
+                </a:solidFill>
+              </a:rPr>
+              <a:t>Reputation Risk</a:t>
+            </a:r>
+          </a:p>
+          <a:p>
+            <a:pPr algn="ctr"/>
+            <a:r>
+              <a:rPr lang="en-US" sz="1400" dirty="0" smtClean="0">
+                <a:solidFill>
+                  <a:schemeClr val="bg2">
+                    <a:lumMod val="25000"/>
+                  </a:schemeClr>
+                </a:solidFill>
+              </a:rPr>
+              <a:t>Liquidity Risk</a:t>
+            </a:r>
+          </a:p>
+          <a:p>
+            <a:pPr algn="ctr"/>
+            <a:r>
+              <a:rPr lang="en-US" sz="1400" dirty="0" smtClean="0">
+                <a:solidFill>
+                  <a:schemeClr val="bg2">
+                    <a:lumMod val="25000"/>
+                  </a:schemeClr>
+                </a:solidFill>
+              </a:rPr>
+              <a:t>Legal Risk</a:t>
+            </a:r>
+          </a:p>
+          <a:p>
+            <a:pPr algn="ctr"/>
+            <a:r>
+              <a:rPr lang="en-US" sz="1400" dirty="0" smtClean="0">
+                <a:solidFill>
+                  <a:schemeClr val="bg2">
+                    <a:lumMod val="25000"/>
+                  </a:schemeClr>
+                </a:solidFill>
+              </a:rPr>
+              <a:t>Project </a:t>
+            </a:r>
+            <a:r>
+              <a:rPr lang="en-US" sz="1400" dirty="0" smtClean="0">
+                <a:solidFill>
+                  <a:schemeClr val="bg2">
+                    <a:lumMod val="25000"/>
+                  </a:schemeClr>
+                </a:solidFill>
+              </a:rPr>
+              <a:t>Management  </a:t>
+            </a:r>
+            <a:r>
+              <a:rPr lang="en-US" sz="1400" dirty="0" smtClean="0">
+                <a:solidFill>
+                  <a:schemeClr val="bg2">
+                    <a:lumMod val="25000"/>
+                  </a:schemeClr>
+                </a:solidFill>
+              </a:rPr>
+              <a:t>Risk</a:t>
+            </a:r>
+          </a:p>
+        </p:txBody>
+      </p:sp>
+      <p:sp>
+        <p:nvSpPr>
+          <p:cNvPr id="17" name="Up Arrow 16"/>
+          <p:cNvSpPr/>
+          <p:nvPr/>
+        </p:nvSpPr>
+        <p:spPr>
+          <a:xfrm>
+            <a:off x="899511" y="1605742"/>
+            <a:ext cx="265922" cy="1520022"/>
+          </a:xfrm>
+          <a:prstGeom prst="upArrow">
+            <a:avLst/>
+          </a:prstGeom>
+          <a:gradFill>
+            <a:gsLst>
+              <a:gs pos="0">
+                <a:schemeClr val="accent1">
+                  <a:tint val="100000"/>
+                  <a:shade val="100000"/>
+                  <a:satMod val="130000"/>
+                  <a:alpha val="27000"/>
+                </a:schemeClr>
+              </a:gs>
+              <a:gs pos="100000">
+                <a:schemeClr val="accent1">
+                  <a:tint val="50000"/>
+                  <a:shade val="100000"/>
+                  <a:satMod val="350000"/>
+                </a:schemeClr>
+              </a:gs>
+            </a:gsLst>
+          </a:gradFill>
+        </p:spPr>
+        <p:style>
+          <a:lnRef idx="1">
+            <a:schemeClr val="accent1"/>
+          </a:lnRef>
+          <a:fillRef idx="3">
+            <a:schemeClr val="accent1"/>
+          </a:fillRef>
+          <a:effectRef idx="2">
+            <a:schemeClr val="accent1"/>
+          </a:effectRef>
+          <a:fontRef idx="minor">
+            <a:schemeClr val="lt1"/>
+          </a:fontRef>
+        </p:style>
+        <p:txBody>
+          <a:bodyPr rtlCol="0" anchor="ctr"/>
+          <a:lstStyle/>
+          <a:p>
+            <a:pPr algn="ctr"/>
+            <a:endParaRPr lang="en-US"/>
+          </a:p>
+        </p:txBody>
+      </p:sp>
+      <p:sp>
+        <p:nvSpPr>
+          <p:cNvPr id="23" name="Rectangle 22"/>
+          <p:cNvSpPr/>
+          <p:nvPr/>
+        </p:nvSpPr>
+        <p:spPr>
+          <a:xfrm>
+            <a:off x="7504805" y="1191369"/>
+            <a:ext cx="1291853" cy="2786962"/>
+          </a:xfrm>
+          <a:prstGeom prst="rect">
+            <a:avLst/>
+          </a:prstGeom>
+          <a:solidFill>
+            <a:schemeClr val="accent1">
+              <a:lumMod val="20000"/>
+              <a:lumOff val="80000"/>
+            </a:schemeClr>
+          </a:solidFill>
+        </p:spPr>
+        <p:style>
+          <a:lnRef idx="1">
+            <a:schemeClr val="accent1"/>
+          </a:lnRef>
+          <a:fillRef idx="3">
+            <a:schemeClr val="accent1"/>
+          </a:fillRef>
+          <a:effectRef idx="2">
+            <a:schemeClr val="accent1"/>
+          </a:effectRef>
+          <a:fontRef idx="minor">
+            <a:schemeClr val="lt1"/>
+          </a:fontRef>
+        </p:style>
+        <p:txBody>
+          <a:bodyPr rtlCol="0" anchor="ctr"/>
+          <a:lstStyle/>
+          <a:p>
+            <a:pPr algn="ctr"/>
+            <a:endParaRPr lang="en-US" sz="1400" dirty="0" smtClean="0">
+              <a:solidFill>
+                <a:schemeClr val="bg2">
+                  <a:lumMod val="25000"/>
+                </a:schemeClr>
+              </a:solidFill>
+            </a:endParaRPr>
+          </a:p>
+          <a:p>
+            <a:pPr algn="ctr"/>
+            <a:r>
+              <a:rPr lang="en-US" sz="1400" dirty="0" smtClean="0">
+                <a:solidFill>
+                  <a:schemeClr val="bg2">
+                    <a:lumMod val="25000"/>
+                  </a:schemeClr>
+                </a:solidFill>
+              </a:rPr>
+              <a:t>Physical. Spectrum, facilities,</a:t>
+            </a:r>
+          </a:p>
+          <a:p>
+            <a:pPr algn="ctr"/>
+            <a:r>
+              <a:rPr lang="en-US" sz="1400" dirty="0" smtClean="0">
+                <a:solidFill>
+                  <a:schemeClr val="bg2">
+                    <a:lumMod val="25000"/>
+                  </a:schemeClr>
+                </a:solidFill>
+              </a:rPr>
+              <a:t>Probabilities, Forensic, Chemical, Biological, </a:t>
+            </a:r>
+            <a:r>
+              <a:rPr lang="en-US" sz="1400" dirty="0" smtClean="0">
+                <a:solidFill>
+                  <a:schemeClr val="bg2">
+                    <a:lumMod val="25000"/>
+                  </a:schemeClr>
+                </a:solidFill>
+              </a:rPr>
+              <a:t> Medical, Nuclear, Military and Intelligence threats concepts</a:t>
+            </a:r>
+            <a:endParaRPr lang="en-US" sz="1400" dirty="0" smtClean="0">
+              <a:solidFill>
+                <a:schemeClr val="bg2">
+                  <a:lumMod val="25000"/>
+                </a:schemeClr>
+              </a:solidFill>
+            </a:endParaRPr>
+          </a:p>
+          <a:p>
+            <a:pPr algn="ctr"/>
+            <a:endParaRPr lang="en-US" sz="1400" dirty="0">
+              <a:solidFill>
+                <a:schemeClr val="bg2">
+                  <a:lumMod val="25000"/>
+                </a:schemeClr>
+              </a:solidFill>
+            </a:endParaRPr>
+          </a:p>
+        </p:txBody>
+      </p:sp>
+      <p:sp>
+        <p:nvSpPr>
+          <p:cNvPr id="24" name="Rounded Rectangle 23"/>
+          <p:cNvSpPr/>
+          <p:nvPr/>
+        </p:nvSpPr>
+        <p:spPr>
+          <a:xfrm>
+            <a:off x="7504804" y="4552257"/>
+            <a:ext cx="1291853" cy="867747"/>
+          </a:xfrm>
+          <a:prstGeom prst="roundRect">
+            <a:avLst/>
+          </a:prstGeom>
+          <a:solidFill>
+            <a:schemeClr val="accent4">
+              <a:lumMod val="75000"/>
+              <a:alpha val="49000"/>
+            </a:schemeClr>
+          </a:solidFill>
+        </p:spPr>
+        <p:style>
+          <a:lnRef idx="1">
+            <a:schemeClr val="accent1"/>
+          </a:lnRef>
+          <a:fillRef idx="3">
+            <a:schemeClr val="accent1"/>
+          </a:fillRef>
+          <a:effectRef idx="2">
+            <a:schemeClr val="accent1"/>
+          </a:effectRef>
+          <a:fontRef idx="minor">
+            <a:schemeClr val="lt1"/>
+          </a:fontRef>
+        </p:style>
+        <p:txBody>
+          <a:bodyPr rtlCol="0" anchor="ctr"/>
+          <a:lstStyle/>
+          <a:p>
+            <a:pPr algn="ctr"/>
+            <a:r>
+              <a:rPr lang="en-US" sz="1400" dirty="0" smtClean="0">
+                <a:solidFill>
+                  <a:schemeClr val="bg2">
+                    <a:lumMod val="25000"/>
+                  </a:schemeClr>
+                </a:solidFill>
+              </a:rPr>
+              <a:t>Other Inputs</a:t>
+            </a:r>
+            <a:endParaRPr lang="en-US" sz="1400" dirty="0">
+              <a:solidFill>
+                <a:schemeClr val="bg2">
+                  <a:lumMod val="25000"/>
+                </a:schemeClr>
+              </a:solidFill>
+            </a:endParaRPr>
+          </a:p>
+        </p:txBody>
+      </p:sp>
+      <p:sp>
+        <p:nvSpPr>
+          <p:cNvPr id="25" name="Up Arrow 24"/>
+          <p:cNvSpPr/>
+          <p:nvPr/>
+        </p:nvSpPr>
+        <p:spPr>
+          <a:xfrm>
+            <a:off x="8017769" y="3978331"/>
+            <a:ext cx="265922" cy="573926"/>
+          </a:xfrm>
+          <a:prstGeom prst="upArrow">
+            <a:avLst/>
+          </a:prstGeom>
+          <a:gradFill>
+            <a:gsLst>
+              <a:gs pos="0">
+                <a:schemeClr val="accent1">
+                  <a:tint val="100000"/>
+                  <a:shade val="100000"/>
+                  <a:satMod val="130000"/>
+                  <a:alpha val="27000"/>
+                </a:schemeClr>
+              </a:gs>
+              <a:gs pos="100000">
+                <a:schemeClr val="accent1">
+                  <a:tint val="50000"/>
+                  <a:shade val="100000"/>
+                  <a:satMod val="350000"/>
+                </a:schemeClr>
+              </a:gs>
+            </a:gsLst>
+          </a:gradFill>
+        </p:spPr>
+        <p:style>
+          <a:lnRef idx="1">
+            <a:schemeClr val="accent1"/>
+          </a:lnRef>
+          <a:fillRef idx="3">
+            <a:schemeClr val="accent1"/>
+          </a:fillRef>
+          <a:effectRef idx="2">
+            <a:schemeClr val="accent1"/>
+          </a:effectRef>
+          <a:fontRef idx="minor">
+            <a:schemeClr val="lt1"/>
+          </a:fontRef>
+        </p:style>
+        <p:txBody>
+          <a:bodyPr rtlCol="0" anchor="ctr"/>
+          <a:lstStyle/>
+          <a:p>
+            <a:pPr algn="ctr"/>
+            <a:endParaRPr lang="en-US"/>
+          </a:p>
+        </p:txBody>
+      </p:sp>
+      <p:sp>
+        <p:nvSpPr>
+          <p:cNvPr id="26" name="Rectangle 25"/>
+          <p:cNvSpPr/>
+          <p:nvPr/>
+        </p:nvSpPr>
+        <p:spPr>
+          <a:xfrm>
+            <a:off x="3168831" y="5255307"/>
+            <a:ext cx="2318395" cy="508518"/>
+          </a:xfrm>
+          <a:prstGeom prst="rect">
+            <a:avLst/>
+          </a:prstGeom>
+          <a:solidFill>
+            <a:schemeClr val="accent1">
+              <a:lumMod val="20000"/>
+              <a:lumOff val="80000"/>
+            </a:schemeClr>
+          </a:solidFill>
+        </p:spPr>
+        <p:style>
+          <a:lnRef idx="1">
+            <a:schemeClr val="accent1"/>
+          </a:lnRef>
+          <a:fillRef idx="3">
+            <a:schemeClr val="accent1"/>
+          </a:fillRef>
+          <a:effectRef idx="2">
+            <a:schemeClr val="accent1"/>
+          </a:effectRef>
+          <a:fontRef idx="minor">
+            <a:schemeClr val="lt1"/>
+          </a:fontRef>
+        </p:style>
+        <p:txBody>
+          <a:bodyPr rtlCol="0" anchor="ctr"/>
+          <a:lstStyle/>
+          <a:p>
+            <a:pPr algn="ctr"/>
+            <a:r>
+              <a:rPr lang="en-US" sz="1600" dirty="0" smtClean="0">
+                <a:solidFill>
+                  <a:schemeClr val="bg2">
+                    <a:lumMod val="25000"/>
+                  </a:schemeClr>
+                </a:solidFill>
+              </a:rPr>
+              <a:t>In Scope with Limited Detail</a:t>
+            </a:r>
+            <a:endParaRPr lang="en-US" sz="1600" dirty="0">
+              <a:solidFill>
+                <a:schemeClr val="bg2">
+                  <a:lumMod val="25000"/>
+                </a:schemeClr>
+              </a:solidFill>
+            </a:endParaRPr>
+          </a:p>
+        </p:txBody>
+      </p:sp>
+      <p:sp>
+        <p:nvSpPr>
+          <p:cNvPr id="28" name="Rectangle 27"/>
+          <p:cNvSpPr/>
+          <p:nvPr/>
+        </p:nvSpPr>
+        <p:spPr>
+          <a:xfrm>
+            <a:off x="3168832" y="4740569"/>
+            <a:ext cx="2318394" cy="514738"/>
+          </a:xfrm>
+          <a:prstGeom prst="rect">
+            <a:avLst/>
+          </a:prstGeom>
+        </p:spPr>
+        <p:style>
+          <a:lnRef idx="1">
+            <a:schemeClr val="accent1"/>
+          </a:lnRef>
+          <a:fillRef idx="3">
+            <a:schemeClr val="accent1"/>
+          </a:fillRef>
+          <a:effectRef idx="2">
+            <a:schemeClr val="accent1"/>
+          </a:effectRef>
+          <a:fontRef idx="minor">
+            <a:schemeClr val="lt1"/>
+          </a:fontRef>
+        </p:style>
+        <p:txBody>
+          <a:bodyPr rtlCol="0" anchor="ctr"/>
+          <a:lstStyle/>
+          <a:p>
+            <a:pPr algn="ctr"/>
+            <a:r>
+              <a:rPr lang="en-US" sz="1600" dirty="0" smtClean="0"/>
+              <a:t>Normative</a:t>
+            </a:r>
+          </a:p>
+          <a:p>
+            <a:pPr algn="ctr"/>
+            <a:r>
+              <a:rPr lang="en-US" sz="1600" dirty="0" smtClean="0"/>
+              <a:t>(Formal Specification)</a:t>
+            </a:r>
+            <a:endParaRPr lang="en-US" sz="1600" dirty="0"/>
+          </a:p>
+        </p:txBody>
+      </p:sp>
+      <p:sp>
+        <p:nvSpPr>
+          <p:cNvPr id="30" name="Rounded Rectangle 29"/>
+          <p:cNvSpPr/>
+          <p:nvPr/>
+        </p:nvSpPr>
+        <p:spPr>
+          <a:xfrm>
+            <a:off x="3168832" y="5763826"/>
+            <a:ext cx="2318394" cy="532624"/>
+          </a:xfrm>
+          <a:prstGeom prst="roundRect">
+            <a:avLst/>
+          </a:prstGeom>
+          <a:solidFill>
+            <a:schemeClr val="accent4">
+              <a:lumMod val="75000"/>
+              <a:alpha val="49000"/>
+            </a:schemeClr>
+          </a:solidFill>
+        </p:spPr>
+        <p:style>
+          <a:lnRef idx="1">
+            <a:schemeClr val="accent1"/>
+          </a:lnRef>
+          <a:fillRef idx="3">
+            <a:schemeClr val="accent1"/>
+          </a:fillRef>
+          <a:effectRef idx="2">
+            <a:schemeClr val="accent1"/>
+          </a:effectRef>
+          <a:fontRef idx="minor">
+            <a:schemeClr val="lt1"/>
+          </a:fontRef>
+        </p:style>
+        <p:txBody>
+          <a:bodyPr rtlCol="0" anchor="ctr"/>
+          <a:lstStyle/>
+          <a:p>
+            <a:pPr algn="ctr"/>
+            <a:r>
+              <a:rPr lang="en-US" dirty="0" smtClean="0">
+                <a:solidFill>
+                  <a:schemeClr val="bg2">
+                    <a:lumMod val="25000"/>
+                  </a:schemeClr>
+                </a:solidFill>
+              </a:rPr>
+              <a:t>Informative</a:t>
+            </a:r>
+            <a:endParaRPr lang="en-US" dirty="0">
+              <a:solidFill>
+                <a:schemeClr val="bg2">
+                  <a:lumMod val="25000"/>
+                </a:schemeClr>
+              </a:solidFill>
+            </a:endParaRPr>
+          </a:p>
+        </p:txBody>
+      </p:sp>
+      <p:sp>
+        <p:nvSpPr>
+          <p:cNvPr id="31" name="TextBox 30"/>
+          <p:cNvSpPr txBox="1"/>
+          <p:nvPr/>
+        </p:nvSpPr>
+        <p:spPr>
+          <a:xfrm>
+            <a:off x="4001130" y="4371237"/>
+            <a:ext cx="803425" cy="369332"/>
+          </a:xfrm>
+          <a:prstGeom prst="rect">
+            <a:avLst/>
+          </a:prstGeom>
+          <a:noFill/>
+        </p:spPr>
+        <p:txBody>
+          <a:bodyPr wrap="none" rtlCol="0">
+            <a:spAutoFit/>
+          </a:bodyPr>
+          <a:lstStyle/>
+          <a:p>
+            <a:r>
+              <a:rPr lang="en-US" dirty="0" smtClean="0"/>
+              <a:t>Legion</a:t>
+            </a:r>
+            <a:endParaRPr lang="en-US" dirty="0"/>
+          </a:p>
+        </p:txBody>
+      </p:sp>
+    </p:spTree>
+    <p:extLst>
+      <p:ext uri="{BB962C8B-B14F-4D97-AF65-F5344CB8AC3E}">
+        <p14:creationId xmlns:p14="http://schemas.microsoft.com/office/powerpoint/2010/main" val="3445877020"/>
       </p:ext>
     </p:extLst>
   </p:cSld>

</xml_diff>

<commit_message>
Final for TF and AB Review, addresses comments recieved.
</commit_message>
<xml_diff>
--- a/docs/RFP/Threat-Risk RFP Pictures.pptx
+++ b/docs/RFP/Threat-Risk RFP Pictures.pptx
@@ -291,7 +291,7 @@
           <a:p>
             <a:fld id="{AFD66651-D9BC-4BF5-827C-0F78836D3353}" type="datetimeFigureOut">
               <a:rPr lang="en-US" smtClean="0"/>
-              <a:t>6/6/2014</a:t>
+              <a:t>6/13/2014</a:t>
             </a:fld>
             <a:endParaRPr lang="en-US"/>
           </a:p>
@@ -461,7 +461,7 @@
           <a:p>
             <a:fld id="{AFD66651-D9BC-4BF5-827C-0F78836D3353}" type="datetimeFigureOut">
               <a:rPr lang="en-US" smtClean="0"/>
-              <a:t>6/6/2014</a:t>
+              <a:t>6/13/2014</a:t>
             </a:fld>
             <a:endParaRPr lang="en-US"/>
           </a:p>
@@ -641,7 +641,7 @@
           <a:p>
             <a:fld id="{AFD66651-D9BC-4BF5-827C-0F78836D3353}" type="datetimeFigureOut">
               <a:rPr lang="en-US" smtClean="0"/>
-              <a:t>6/6/2014</a:t>
+              <a:t>6/13/2014</a:t>
             </a:fld>
             <a:endParaRPr lang="en-US"/>
           </a:p>
@@ -811,7 +811,7 @@
           <a:p>
             <a:fld id="{AFD66651-D9BC-4BF5-827C-0F78836D3353}" type="datetimeFigureOut">
               <a:rPr lang="en-US" smtClean="0"/>
-              <a:t>6/6/2014</a:t>
+              <a:t>6/13/2014</a:t>
             </a:fld>
             <a:endParaRPr lang="en-US"/>
           </a:p>
@@ -1057,7 +1057,7 @@
           <a:p>
             <a:fld id="{AFD66651-D9BC-4BF5-827C-0F78836D3353}" type="datetimeFigureOut">
               <a:rPr lang="en-US" smtClean="0"/>
-              <a:t>6/6/2014</a:t>
+              <a:t>6/13/2014</a:t>
             </a:fld>
             <a:endParaRPr lang="en-US"/>
           </a:p>
@@ -1345,7 +1345,7 @@
           <a:p>
             <a:fld id="{AFD66651-D9BC-4BF5-827C-0F78836D3353}" type="datetimeFigureOut">
               <a:rPr lang="en-US" smtClean="0"/>
-              <a:t>6/6/2014</a:t>
+              <a:t>6/13/2014</a:t>
             </a:fld>
             <a:endParaRPr lang="en-US"/>
           </a:p>
@@ -1767,7 +1767,7 @@
           <a:p>
             <a:fld id="{AFD66651-D9BC-4BF5-827C-0F78836D3353}" type="datetimeFigureOut">
               <a:rPr lang="en-US" smtClean="0"/>
-              <a:t>6/6/2014</a:t>
+              <a:t>6/13/2014</a:t>
             </a:fld>
             <a:endParaRPr lang="en-US"/>
           </a:p>
@@ -1885,7 +1885,7 @@
           <a:p>
             <a:fld id="{AFD66651-D9BC-4BF5-827C-0F78836D3353}" type="datetimeFigureOut">
               <a:rPr lang="en-US" smtClean="0"/>
-              <a:t>6/6/2014</a:t>
+              <a:t>6/13/2014</a:t>
             </a:fld>
             <a:endParaRPr lang="en-US"/>
           </a:p>
@@ -1980,7 +1980,7 @@
           <a:p>
             <a:fld id="{AFD66651-D9BC-4BF5-827C-0F78836D3353}" type="datetimeFigureOut">
               <a:rPr lang="en-US" smtClean="0"/>
-              <a:t>6/6/2014</a:t>
+              <a:t>6/13/2014</a:t>
             </a:fld>
             <a:endParaRPr lang="en-US"/>
           </a:p>
@@ -2257,7 +2257,7 @@
           <a:p>
             <a:fld id="{AFD66651-D9BC-4BF5-827C-0F78836D3353}" type="datetimeFigureOut">
               <a:rPr lang="en-US" smtClean="0"/>
-              <a:t>6/6/2014</a:t>
+              <a:t>6/13/2014</a:t>
             </a:fld>
             <a:endParaRPr lang="en-US"/>
           </a:p>
@@ -2510,7 +2510,7 @@
           <a:p>
             <a:fld id="{AFD66651-D9BC-4BF5-827C-0F78836D3353}" type="datetimeFigureOut">
               <a:rPr lang="en-US" smtClean="0"/>
-              <a:t>6/6/2014</a:t>
+              <a:t>6/13/2014</a:t>
             </a:fld>
             <a:endParaRPr lang="en-US"/>
           </a:p>
@@ -2723,7 +2723,7 @@
           <a:p>
             <a:fld id="{AFD66651-D9BC-4BF5-827C-0F78836D3353}" type="datetimeFigureOut">
               <a:rPr lang="en-US" smtClean="0"/>
-              <a:t>6/6/2014</a:t>
+              <a:t>6/13/2014</a:t>
             </a:fld>
             <a:endParaRPr lang="en-US"/>
           </a:p>
@@ -5218,27 +5218,7 @@
                   </a:schemeClr>
                 </a:solidFill>
               </a:rPr>
-              <a:t>Law Enforcement / </a:t>
-            </a:r>
-            <a:r>
-              <a:rPr lang="en-US" sz="1400" dirty="0" smtClean="0">
-                <a:solidFill>
-                  <a:schemeClr val="bg2">
-                    <a:lumMod val="25000"/>
-                  </a:schemeClr>
-                </a:solidFill>
-              </a:rPr>
-              <a:t>Emergency </a:t>
-            </a:r>
-            <a:r>
-              <a:rPr lang="en-US" sz="1400" dirty="0" smtClean="0">
-                <a:solidFill>
-                  <a:schemeClr val="bg2">
-                    <a:lumMod val="25000"/>
-                  </a:schemeClr>
-                </a:solidFill>
-              </a:rPr>
-              <a:t>Management Concepts</a:t>
+              <a:t>Law Enforcement / Emergency Management Concepts</a:t>
             </a:r>
           </a:p>
           <a:p>
@@ -5403,17 +5383,7 @@
                   </a:schemeClr>
                 </a:solidFill>
               </a:rPr>
-              <a:t>EDXL / </a:t>
-            </a:r>
-            <a:r>
-              <a:rPr lang="en-US" sz="1400" dirty="0" smtClean="0">
-                <a:solidFill>
-                  <a:schemeClr val="bg2">
-                    <a:lumMod val="25000"/>
-                  </a:schemeClr>
-                </a:solidFill>
-              </a:rPr>
-              <a:t>CAP</a:t>
+              <a:t>EDXL / CAP</a:t>
             </a:r>
           </a:p>
           <a:p>
@@ -5488,13 +5458,6 @@
               </a:rPr>
               <a:t>STIX/TAXII/Cybox</a:t>
             </a:r>
-            <a:endParaRPr lang="en-US" sz="1400" dirty="0" smtClean="0">
-              <a:solidFill>
-                <a:schemeClr val="bg2">
-                  <a:lumMod val="25000"/>
-                </a:schemeClr>
-              </a:solidFill>
-            </a:endParaRPr>
           </a:p>
           <a:p>
             <a:pPr algn="ctr"/>
@@ -5944,27 +5907,7 @@
                   </a:schemeClr>
                 </a:solidFill>
               </a:rPr>
-              <a:t>Project </a:t>
-            </a:r>
-            <a:r>
-              <a:rPr lang="en-US" sz="1400" dirty="0" smtClean="0">
-                <a:solidFill>
-                  <a:schemeClr val="bg2">
-                    <a:lumMod val="25000"/>
-                  </a:schemeClr>
-                </a:solidFill>
-              </a:rPr>
-              <a:t>Management  </a:t>
-            </a:r>
-            <a:r>
-              <a:rPr lang="en-US" sz="1400" dirty="0" smtClean="0">
-                <a:solidFill>
-                  <a:schemeClr val="bg2">
-                    <a:lumMod val="25000"/>
-                  </a:schemeClr>
-                </a:solidFill>
-              </a:rPr>
-              <a:t>Risk</a:t>
+              <a:t>Project Management  Risk</a:t>
             </a:r>
           </a:p>
         </p:txBody>
@@ -6097,25 +6040,8 @@
                   </a:schemeClr>
                 </a:solidFill>
               </a:rPr>
-              <a:t>Probabilities, Forensic, Chemical, Biological, </a:t>
-            </a:r>
-            <a:r>
-              <a:rPr lang="en-US" sz="1400" dirty="0" smtClean="0">
-                <a:solidFill>
-                  <a:schemeClr val="bg2">
-                    <a:lumMod val="25000"/>
-                  </a:schemeClr>
-                </a:solidFill>
-              </a:rPr>
-              <a:t> Medical, Nuclear, Military and Intelligence threats concepts</a:t>
-            </a:r>
-            <a:endParaRPr lang="en-US" sz="1400" dirty="0" smtClean="0">
-              <a:solidFill>
-                <a:schemeClr val="bg2">
-                  <a:lumMod val="25000"/>
-                </a:schemeClr>
-              </a:solidFill>
-            </a:endParaRPr>
+              <a:t>Probabilities, Forensic, Chemical, Biological,  Medical, Nuclear, Military and Intelligence threats concepts</a:t>
+            </a:r>
           </a:p>
           <a:p>
             <a:pPr algn="ctr"/>
@@ -6424,7 +6350,7 @@
         <p:spPr>
           <a:xfrm>
             <a:off x="4001130" y="4371237"/>
-            <a:ext cx="803425" cy="369332"/>
+            <a:ext cx="864019" cy="369332"/>
           </a:xfrm>
           <a:prstGeom prst="rect">
             <a:avLst/>
@@ -6439,7 +6365,7 @@
           <a:p>
             <a:r>
               <a:rPr lang="en-US" dirty="0" smtClean="0"/>
-              <a:t>Legion</a:t>
+              <a:t>Legend</a:t>
             </a:r>
             <a:endParaRPr lang="en-US" dirty="0"/>
           </a:p>

</xml_diff>